<commit_message>
versione definitiva tesi e presentazione
</commit_message>
<xml_diff>
--- a/Relazione/Da IEEE 11073-10206 a FHIR.pptx
+++ b/Relazione/Da IEEE 11073-10206 a FHIR.pptx
@@ -5,15 +5,19 @@
     <p:sldMasterId id="2147483658" r:id="rId4"/>
   </p:sldMasterIdLst>
   <p:notesMasterIdLst>
-    <p:notesMasterId r:id="rId8"/>
+    <p:notesMasterId r:id="rId12"/>
   </p:notesMasterIdLst>
   <p:handoutMasterIdLst>
-    <p:handoutMasterId r:id="rId9"/>
+    <p:handoutMasterId r:id="rId13"/>
   </p:handoutMasterIdLst>
   <p:sldIdLst>
     <p:sldId id="410" r:id="rId5"/>
     <p:sldId id="408" r:id="rId6"/>
-    <p:sldId id="398" r:id="rId7"/>
+    <p:sldId id="412" r:id="rId7"/>
+    <p:sldId id="414" r:id="rId8"/>
+    <p:sldId id="415" r:id="rId9"/>
+    <p:sldId id="413" r:id="rId10"/>
+    <p:sldId id="411" r:id="rId11"/>
   </p:sldIdLst>
   <p:sldSz cx="12192000" cy="6858000"/>
   <p:notesSz cx="6858000" cy="9144000"/>
@@ -193,7 +197,7 @@
             <a:pPr rtl="0"/>
             <a:fld id="{F43FFF67-0A66-4BA5-8D01-D7436A93C5DC}" type="datetime1">
               <a:rPr lang="it-IT" smtClean="0"/>
-              <a:t>07/07/2024</a:t>
+              <a:t>12/07/2024</a:t>
             </a:fld>
             <a:endParaRPr lang="it-IT" dirty="0"/>
           </a:p>
@@ -412,7 +416,7 @@
             <a:fld id="{CCC7B77D-D2C2-452D-80DB-AB1E949B0C69}" type="datetime1">
               <a:rPr lang="it-IT" smtClean="0"/>
               <a:pPr/>
-              <a:t>07/07/2024</a:t>
+              <a:t>12/07/2024</a:t>
             </a:fld>
             <a:endParaRPr lang="it-IT" dirty="0"/>
           </a:p>
@@ -953,7 +957,7 @@
             <a:pPr rtl="0"/>
             <a:fld id="{A89C7E07-3C67-C64C-8DA0-0404F6303970}" type="slidenum">
               <a:rPr lang="it-IT" smtClean="0"/>
-              <a:t>3</a:t>
+              <a:t>4</a:t>
             </a:fld>
             <a:endParaRPr lang="it-IT" dirty="0"/>
           </a:p>
@@ -962,7 +966,101 @@
     </p:spTree>
     <p:extLst>
       <p:ext uri="{BB962C8B-B14F-4D97-AF65-F5344CB8AC3E}">
-        <p14:creationId xmlns:p14="http://schemas.microsoft.com/office/powerpoint/2010/main" val="1765923172"/>
+        <p14:creationId xmlns:p14="http://schemas.microsoft.com/office/powerpoint/2010/main" val="996093964"/>
+      </p:ext>
+    </p:extLst>
+  </p:cSld>
+  <p:clrMapOvr>
+    <a:masterClrMapping/>
+  </p:clrMapOvr>
+</p:notes>
+</file>
+
+<file path=ppt/notesSlides/notesSlide4.xml><?xml version="1.0" encoding="utf-8"?>
+<p:notes xmlns:a="http://schemas.openxmlformats.org/drawingml/2006/main" xmlns:r="http://schemas.openxmlformats.org/officeDocument/2006/relationships" xmlns:p="http://schemas.openxmlformats.org/presentationml/2006/main">
+  <p:cSld>
+    <p:spTree>
+      <p:nvGrpSpPr>
+        <p:cNvPr id="1" name=""/>
+        <p:cNvGrpSpPr/>
+        <p:nvPr/>
+      </p:nvGrpSpPr>
+      <p:grpSpPr>
+        <a:xfrm>
+          <a:off x="0" y="0"/>
+          <a:ext cx="0" cy="0"/>
+          <a:chOff x="0" y="0"/>
+          <a:chExt cx="0" cy="0"/>
+        </a:xfrm>
+      </p:grpSpPr>
+      <p:sp>
+        <p:nvSpPr>
+          <p:cNvPr id="2" name="Segnaposto immagine diapositiva 1"/>
+          <p:cNvSpPr>
+            <a:spLocks noGrp="1" noRot="1" noChangeAspect="1"/>
+          </p:cNvSpPr>
+          <p:nvPr>
+            <p:ph type="sldImg"/>
+          </p:nvPr>
+        </p:nvSpPr>
+        <p:spPr/>
+      </p:sp>
+      <p:sp>
+        <p:nvSpPr>
+          <p:cNvPr id="3" name="Segnaposto note 2"/>
+          <p:cNvSpPr>
+            <a:spLocks noGrp="1"/>
+          </p:cNvSpPr>
+          <p:nvPr>
+            <p:ph type="body" idx="1"/>
+          </p:nvPr>
+        </p:nvSpPr>
+        <p:spPr/>
+        <p:txBody>
+          <a:bodyPr rtlCol="0"/>
+          <a:lstStyle>
+            <a:defPPr>
+              <a:defRPr lang="it-IT"/>
+            </a:defPPr>
+          </a:lstStyle>
+          <a:p>
+            <a:pPr rtl="0"/>
+            <a:endParaRPr lang="it-IT" dirty="0"/>
+          </a:p>
+        </p:txBody>
+      </p:sp>
+      <p:sp>
+        <p:nvSpPr>
+          <p:cNvPr id="4" name="Segnaposto numero diapositiva 3"/>
+          <p:cNvSpPr>
+            <a:spLocks noGrp="1"/>
+          </p:cNvSpPr>
+          <p:nvPr>
+            <p:ph type="sldNum" sz="quarter" idx="5"/>
+          </p:nvPr>
+        </p:nvSpPr>
+        <p:spPr/>
+        <p:txBody>
+          <a:bodyPr rtlCol="0"/>
+          <a:lstStyle>
+            <a:defPPr>
+              <a:defRPr lang="it-IT"/>
+            </a:defPPr>
+          </a:lstStyle>
+          <a:p>
+            <a:pPr rtl="0"/>
+            <a:fld id="{A89C7E07-3C67-C64C-8DA0-0404F6303970}" type="slidenum">
+              <a:rPr lang="it-IT" smtClean="0"/>
+              <a:t>7</a:t>
+            </a:fld>
+            <a:endParaRPr lang="it-IT" dirty="0"/>
+          </a:p>
+        </p:txBody>
+      </p:sp>
+    </p:spTree>
+    <p:extLst>
+      <p:ext uri="{BB962C8B-B14F-4D97-AF65-F5344CB8AC3E}">
+        <p14:creationId xmlns:p14="http://schemas.microsoft.com/office/powerpoint/2010/main" val="2975819521"/>
       </p:ext>
     </p:extLst>
   </p:cSld>
@@ -9103,7 +9201,7 @@
     <p:sldLayoutId id="2147483704" r:id="rId12"/>
     <p:sldLayoutId id="2147483703" r:id="rId13"/>
   </p:sldLayoutIdLst>
-  <p:hf sldNum="0" hdr="0" ftr="0" dt="0"/>
+  <p:hf hdr="0" ftr="0" dt="0"/>
   <p:txStyles>
     <p:titleStyle>
       <a:lvl1pPr algn="l" defTabSz="914400" rtl="0" eaLnBrk="1" latinLnBrk="0" hangingPunct="1">
@@ -9888,17 +9986,1316 @@
             <a:pPr rtl="0"/>
             <a:r>
               <a:rPr lang="it-IT" dirty="0"/>
-              <a:t>Tecniche di comunicazione efficaci</a:t>
+              <a:t>Il problema</a:t>
             </a:r>
+          </a:p>
+        </p:txBody>
+      </p:sp>
+      <p:grpSp>
+        <p:nvGrpSpPr>
+          <p:cNvPr id="14" name="Gruppo 13">
+            <a:extLst>
+              <a:ext uri="{FF2B5EF4-FFF2-40B4-BE49-F238E27FC236}">
+                <a16:creationId xmlns:a16="http://schemas.microsoft.com/office/drawing/2014/main" id="{313FE5FD-1129-8C82-F9AA-3228203F974A}"/>
+              </a:ext>
+            </a:extLst>
+          </p:cNvPr>
+          <p:cNvGrpSpPr/>
+          <p:nvPr/>
+        </p:nvGrpSpPr>
+        <p:grpSpPr>
+          <a:xfrm>
+            <a:off x="982671" y="3031292"/>
+            <a:ext cx="9584465" cy="2287740"/>
+            <a:chOff x="691309" y="4292131"/>
+            <a:chExt cx="9584465" cy="2287740"/>
+          </a:xfrm>
+        </p:grpSpPr>
+        <p:pic>
+          <p:nvPicPr>
+            <p:cNvPr id="45" name="Picture 19">
+              <a:extLst>
+                <a:ext uri="{FF2B5EF4-FFF2-40B4-BE49-F238E27FC236}">
+                  <a16:creationId xmlns:a16="http://schemas.microsoft.com/office/drawing/2014/main" id="{D7322607-D44B-0DC0-2921-4EEC1AF711AA}"/>
+                </a:ext>
+              </a:extLst>
+            </p:cNvPr>
+            <p:cNvPicPr>
+              <a:picLocks noChangeAspect="1"/>
+            </p:cNvPicPr>
+            <p:nvPr/>
+          </p:nvPicPr>
+          <p:blipFill rotWithShape="1">
+            <a:blip r:embed="rId3">
+              <a:clrChange>
+                <a:clrFrom>
+                  <a:srgbClr val="FFFFFC"/>
+                </a:clrFrom>
+                <a:clrTo>
+                  <a:srgbClr val="FFFFFC">
+                    <a:alpha val="0"/>
+                  </a:srgbClr>
+                </a:clrTo>
+              </a:clrChange>
+            </a:blip>
+            <a:srcRect t="6671" r="10925" b="23243"/>
+            <a:stretch/>
+          </p:blipFill>
+          <p:spPr>
+            <a:xfrm>
+              <a:off x="1254123" y="4855769"/>
+              <a:ext cx="716899" cy="731647"/>
+            </a:xfrm>
+            <a:prstGeom prst="rect">
+              <a:avLst/>
+            </a:prstGeom>
+          </p:spPr>
+        </p:pic>
+        <p:pic>
+          <p:nvPicPr>
+            <p:cNvPr id="46" name="Picture 20" descr="Afbeeldingsresultaat voor a&amp;d medical blood pressure monitor">
+              <a:extLst>
+                <a:ext uri="{FF2B5EF4-FFF2-40B4-BE49-F238E27FC236}">
+                  <a16:creationId xmlns:a16="http://schemas.microsoft.com/office/drawing/2014/main" id="{50C5A6B4-10E1-91FD-8ED8-6855A5A44C21}"/>
+                </a:ext>
+              </a:extLst>
+            </p:cNvPr>
+            <p:cNvPicPr>
+              <a:picLocks noChangeAspect="1" noChangeArrowheads="1"/>
+            </p:cNvPicPr>
+            <p:nvPr/>
+          </p:nvPicPr>
+          <p:blipFill>
+            <a:blip r:embed="rId4" cstate="print">
+              <a:clrChange>
+                <a:clrFrom>
+                  <a:srgbClr val="FFFFFF"/>
+                </a:clrFrom>
+                <a:clrTo>
+                  <a:srgbClr val="FFFFFF">
+                    <a:alpha val="0"/>
+                  </a:srgbClr>
+                </a:clrTo>
+              </a:clrChange>
+              <a:extLst>
+                <a:ext uri="{28A0092B-C50C-407E-A947-70E740481C1C}">
+                  <a14:useLocalDpi xmlns:a14="http://schemas.microsoft.com/office/drawing/2010/main" val="0"/>
+                </a:ext>
+              </a:extLst>
+            </a:blip>
+            <a:srcRect/>
+            <a:stretch>
+              <a:fillRect/>
+            </a:stretch>
+          </p:blipFill>
+          <p:spPr bwMode="auto">
+            <a:xfrm>
+              <a:off x="743736" y="5517330"/>
+              <a:ext cx="1153321" cy="790932"/>
+            </a:xfrm>
+            <a:prstGeom prst="rect">
+              <a:avLst/>
+            </a:prstGeom>
+            <a:noFill/>
+            <a:extLst>
+              <a:ext uri="{909E8E84-426E-40DD-AFC4-6F175D3DCCD1}">
+                <a14:hiddenFill xmlns:a14="http://schemas.microsoft.com/office/drawing/2010/main">
+                  <a:solidFill>
+                    <a:srgbClr val="FFFFFF"/>
+                  </a:solidFill>
+                </a14:hiddenFill>
+              </a:ext>
+            </a:extLst>
+          </p:spPr>
+        </p:pic>
+        <p:pic>
+          <p:nvPicPr>
+            <p:cNvPr id="47" name="Picture 6" descr="Afbeeldingsresultaat voor polar bluetooth weight scale">
+              <a:extLst>
+                <a:ext uri="{FF2B5EF4-FFF2-40B4-BE49-F238E27FC236}">
+                  <a16:creationId xmlns:a16="http://schemas.microsoft.com/office/drawing/2014/main" id="{27D2B326-B6EE-357F-39FF-AFA97A757EF2}"/>
+                </a:ext>
+              </a:extLst>
+            </p:cNvPr>
+            <p:cNvPicPr>
+              <a:picLocks noChangeAspect="1" noChangeArrowheads="1"/>
+            </p:cNvPicPr>
+            <p:nvPr/>
+          </p:nvPicPr>
+          <p:blipFill>
+            <a:blip r:embed="rId5" cstate="print">
+              <a:clrChange>
+                <a:clrFrom>
+                  <a:srgbClr val="FFFFFF"/>
+                </a:clrFrom>
+                <a:clrTo>
+                  <a:srgbClr val="FFFFFF">
+                    <a:alpha val="0"/>
+                  </a:srgbClr>
+                </a:clrTo>
+              </a:clrChange>
+              <a:extLst>
+                <a:ext uri="{28A0092B-C50C-407E-A947-70E740481C1C}">
+                  <a14:useLocalDpi xmlns:a14="http://schemas.microsoft.com/office/drawing/2010/main" val="0"/>
+                </a:ext>
+              </a:extLst>
+            </a:blip>
+            <a:srcRect/>
+            <a:stretch>
+              <a:fillRect/>
+            </a:stretch>
+          </p:blipFill>
+          <p:spPr bwMode="auto">
+            <a:xfrm>
+              <a:off x="1897057" y="5374612"/>
+              <a:ext cx="979705" cy="947090"/>
+            </a:xfrm>
+            <a:prstGeom prst="rect">
+              <a:avLst/>
+            </a:prstGeom>
+            <a:noFill/>
+            <a:extLst>
+              <a:ext uri="{909E8E84-426E-40DD-AFC4-6F175D3DCCD1}">
+                <a14:hiddenFill xmlns:a14="http://schemas.microsoft.com/office/drawing/2010/main">
+                  <a:solidFill>
+                    <a:srgbClr val="FFFFFF"/>
+                  </a:solidFill>
+                </a14:hiddenFill>
+              </a:ext>
+            </a:extLst>
+          </p:spPr>
+        </p:pic>
+        <p:pic>
+          <p:nvPicPr>
+            <p:cNvPr id="48" name="Picture 22">
+              <a:extLst>
+                <a:ext uri="{FF2B5EF4-FFF2-40B4-BE49-F238E27FC236}">
+                  <a16:creationId xmlns:a16="http://schemas.microsoft.com/office/drawing/2014/main" id="{675BC08B-759B-47D6-3853-0D95F70EE40C}"/>
+                </a:ext>
+              </a:extLst>
+            </p:cNvPr>
+            <p:cNvPicPr>
+              <a:picLocks noChangeAspect="1"/>
+            </p:cNvPicPr>
+            <p:nvPr/>
+          </p:nvPicPr>
+          <p:blipFill>
+            <a:blip r:embed="rId6" cstate="print">
+              <a:extLst>
+                <a:ext uri="{28A0092B-C50C-407E-A947-70E740481C1C}">
+                  <a14:useLocalDpi xmlns:a14="http://schemas.microsoft.com/office/drawing/2010/main" val="0"/>
+                </a:ext>
+              </a:extLst>
+            </a:blip>
+            <a:stretch>
+              <a:fillRect/>
+            </a:stretch>
+          </p:blipFill>
+          <p:spPr>
+            <a:xfrm>
+              <a:off x="4706869" y="5329857"/>
+              <a:ext cx="1122595" cy="833062"/>
+            </a:xfrm>
+            <a:prstGeom prst="rect">
+              <a:avLst/>
+            </a:prstGeom>
+          </p:spPr>
+        </p:pic>
+        <p:sp>
+          <p:nvSpPr>
+            <p:cNvPr id="49" name="Rounded Rectangle 9">
+              <a:extLst>
+                <a:ext uri="{FF2B5EF4-FFF2-40B4-BE49-F238E27FC236}">
+                  <a16:creationId xmlns:a16="http://schemas.microsoft.com/office/drawing/2014/main" id="{594C1D3C-6011-8580-05EB-E5544975C781}"/>
+                </a:ext>
+              </a:extLst>
+            </p:cNvPr>
+            <p:cNvSpPr/>
+            <p:nvPr/>
+          </p:nvSpPr>
+          <p:spPr>
+            <a:xfrm>
+              <a:off x="691309" y="4292131"/>
+              <a:ext cx="2298117" cy="2143821"/>
+            </a:xfrm>
+            <a:prstGeom prst="roundRect">
+              <a:avLst>
+                <a:gd name="adj" fmla="val 12253"/>
+              </a:avLst>
+            </a:prstGeom>
+            <a:noFill/>
+            <a:ln w="57150"/>
+          </p:spPr>
+          <p:style>
+            <a:lnRef idx="2">
+              <a:schemeClr val="accent1">
+                <a:shade val="50000"/>
+              </a:schemeClr>
+            </a:lnRef>
+            <a:fillRef idx="1">
+              <a:schemeClr val="accent1"/>
+            </a:fillRef>
+            <a:effectRef idx="0">
+              <a:schemeClr val="accent1"/>
+            </a:effectRef>
+            <a:fontRef idx="minor">
+              <a:schemeClr val="lt1"/>
+            </a:fontRef>
+          </p:style>
+          <p:txBody>
+            <a:bodyPr bIns="0" rtlCol="0" anchor="t" anchorCtr="0"/>
+            <a:lstStyle/>
+            <a:p>
+              <a:pPr algn="ctr" defTabSz="1219170">
+                <a:defRPr/>
+              </a:pPr>
+              <a:r>
+                <a:rPr lang="en-US" sz="1200" dirty="0" err="1">
+                  <a:solidFill>
+                    <a:schemeClr val="bg1"/>
+                  </a:solidFill>
+                  <a:latin typeface="+mj-lt"/>
+                </a:rPr>
+                <a:t>Dispositivi</a:t>
+              </a:r>
+              <a:r>
+                <a:rPr lang="en-US" sz="1200" dirty="0">
+                  <a:solidFill>
+                    <a:schemeClr val="bg1"/>
+                  </a:solidFill>
+                  <a:latin typeface="+mj-lt"/>
+                </a:rPr>
+                <a:t> </a:t>
+              </a:r>
+              <a:r>
+                <a:rPr lang="en-US" sz="1200" dirty="0" err="1">
+                  <a:solidFill>
+                    <a:schemeClr val="bg1"/>
+                  </a:solidFill>
+                  <a:latin typeface="+mj-lt"/>
+                </a:rPr>
+                <a:t>rilevamento</a:t>
+              </a:r>
+              <a:r>
+                <a:rPr lang="en-US" sz="1200" dirty="0">
+                  <a:solidFill>
+                    <a:schemeClr val="bg1"/>
+                  </a:solidFill>
+                  <a:latin typeface="+mj-lt"/>
+                </a:rPr>
+                <a:t> salute </a:t>
+              </a:r>
+              <a:r>
+                <a:rPr lang="en-US" sz="1200" dirty="0" err="1">
+                  <a:solidFill>
+                    <a:schemeClr val="bg1"/>
+                  </a:solidFill>
+                  <a:latin typeface="+mj-lt"/>
+                </a:rPr>
+                <a:t>personale</a:t>
+              </a:r>
+              <a:endParaRPr lang="en-US" sz="1200" dirty="0">
+                <a:solidFill>
+                  <a:schemeClr val="bg1"/>
+                </a:solidFill>
+                <a:latin typeface="+mj-lt"/>
+              </a:endParaRPr>
+            </a:p>
+          </p:txBody>
+        </p:sp>
+        <p:sp>
+          <p:nvSpPr>
+            <p:cNvPr id="50" name="Rounded Rectangle 10">
+              <a:extLst>
+                <a:ext uri="{FF2B5EF4-FFF2-40B4-BE49-F238E27FC236}">
+                  <a16:creationId xmlns:a16="http://schemas.microsoft.com/office/drawing/2014/main" id="{A39C87CE-B099-D02F-B842-A19989605D80}"/>
+                </a:ext>
+              </a:extLst>
+            </p:cNvPr>
+            <p:cNvSpPr/>
+            <p:nvPr/>
+          </p:nvSpPr>
+          <p:spPr>
+            <a:xfrm>
+              <a:off x="4606443" y="4483665"/>
+              <a:ext cx="1863541" cy="1795057"/>
+            </a:xfrm>
+            <a:prstGeom prst="roundRect">
+              <a:avLst>
+                <a:gd name="adj" fmla="val 12253"/>
+              </a:avLst>
+            </a:prstGeom>
+            <a:noFill/>
+            <a:ln w="57150"/>
+          </p:spPr>
+          <p:style>
+            <a:lnRef idx="2">
+              <a:schemeClr val="accent1">
+                <a:shade val="50000"/>
+              </a:schemeClr>
+            </a:lnRef>
+            <a:fillRef idx="1">
+              <a:schemeClr val="accent1"/>
+            </a:fillRef>
+            <a:effectRef idx="0">
+              <a:schemeClr val="accent1"/>
+            </a:effectRef>
+            <a:fontRef idx="minor">
+              <a:schemeClr val="lt1"/>
+            </a:fontRef>
+          </p:style>
+          <p:txBody>
+            <a:bodyPr bIns="0" rtlCol="0" anchor="t" anchorCtr="0"/>
+            <a:lstStyle/>
+            <a:p>
+              <a:pPr algn="ctr" defTabSz="1219170">
+                <a:defRPr/>
+              </a:pPr>
+              <a:r>
+                <a:rPr lang="en-US" sz="1200" dirty="0">
+                  <a:solidFill>
+                    <a:schemeClr val="bg1"/>
+                  </a:solidFill>
+                  <a:latin typeface="+mj-lt"/>
+                </a:rPr>
+                <a:t>App </a:t>
+              </a:r>
+              <a:r>
+                <a:rPr lang="en-US" sz="1200" dirty="0" err="1">
+                  <a:solidFill>
+                    <a:schemeClr val="bg1"/>
+                  </a:solidFill>
+                  <a:latin typeface="+mj-lt"/>
+                </a:rPr>
+                <a:t>proprietarie</a:t>
+              </a:r>
+              <a:r>
+                <a:rPr lang="en-US" sz="1200" dirty="0">
+                  <a:solidFill>
+                    <a:schemeClr val="bg1"/>
+                  </a:solidFill>
+                  <a:latin typeface="+mj-lt"/>
+                </a:rPr>
+                <a:t> e </a:t>
+              </a:r>
+              <a:r>
+                <a:rPr lang="en-US" sz="1200" dirty="0" err="1">
+                  <a:solidFill>
+                    <a:schemeClr val="bg1"/>
+                  </a:solidFill>
+                  <a:latin typeface="+mj-lt"/>
+                </a:rPr>
+                <a:t>dispositivi</a:t>
+              </a:r>
+              <a:r>
+                <a:rPr lang="en-US" sz="1200" dirty="0">
+                  <a:solidFill>
+                    <a:schemeClr val="bg1"/>
+                  </a:solidFill>
+                  <a:latin typeface="+mj-lt"/>
+                </a:rPr>
+                <a:t> gateway </a:t>
+              </a:r>
+            </a:p>
+          </p:txBody>
+        </p:sp>
+        <p:pic>
+          <p:nvPicPr>
+            <p:cNvPr id="51" name="Picture 25">
+              <a:extLst>
+                <a:ext uri="{FF2B5EF4-FFF2-40B4-BE49-F238E27FC236}">
+                  <a16:creationId xmlns:a16="http://schemas.microsoft.com/office/drawing/2014/main" id="{BC59C866-6111-B925-957E-93772EC7B664}"/>
+                </a:ext>
+              </a:extLst>
+            </p:cNvPr>
+            <p:cNvPicPr>
+              <a:picLocks noChangeAspect="1"/>
+            </p:cNvPicPr>
+            <p:nvPr/>
+          </p:nvPicPr>
+          <p:blipFill>
+            <a:blip r:embed="rId7" cstate="print">
+              <a:extLst>
+                <a:ext uri="{28A0092B-C50C-407E-A947-70E740481C1C}">
+                  <a14:useLocalDpi xmlns:a14="http://schemas.microsoft.com/office/drawing/2010/main" val="0"/>
+                </a:ext>
+              </a:extLst>
+            </a:blip>
+            <a:stretch>
+              <a:fillRect/>
+            </a:stretch>
+          </p:blipFill>
+          <p:spPr>
+            <a:xfrm>
+              <a:off x="5743912" y="5449336"/>
+              <a:ext cx="771791" cy="707080"/>
+            </a:xfrm>
+            <a:prstGeom prst="rect">
+              <a:avLst/>
+            </a:prstGeom>
+          </p:spPr>
+        </p:pic>
+        <p:sp>
+          <p:nvSpPr>
+            <p:cNvPr id="53" name="Rounded Rectangle 10">
+              <a:extLst>
+                <a:ext uri="{FF2B5EF4-FFF2-40B4-BE49-F238E27FC236}">
+                  <a16:creationId xmlns:a16="http://schemas.microsoft.com/office/drawing/2014/main" id="{E4FE54F5-9E4F-2868-212D-FDE3C5468538}"/>
+                </a:ext>
+              </a:extLst>
+            </p:cNvPr>
+            <p:cNvSpPr/>
+            <p:nvPr/>
+          </p:nvSpPr>
+          <p:spPr>
+            <a:xfrm>
+              <a:off x="8135292" y="4294368"/>
+              <a:ext cx="1955360" cy="2143821"/>
+            </a:xfrm>
+            <a:prstGeom prst="roundRect">
+              <a:avLst>
+                <a:gd name="adj" fmla="val 12253"/>
+              </a:avLst>
+            </a:prstGeom>
+            <a:noFill/>
+            <a:ln w="57150"/>
+          </p:spPr>
+          <p:style>
+            <a:lnRef idx="2">
+              <a:schemeClr val="accent1">
+                <a:shade val="50000"/>
+              </a:schemeClr>
+            </a:lnRef>
+            <a:fillRef idx="1">
+              <a:schemeClr val="accent1"/>
+            </a:fillRef>
+            <a:effectRef idx="0">
+              <a:schemeClr val="accent1"/>
+            </a:effectRef>
+            <a:fontRef idx="minor">
+              <a:schemeClr val="lt1"/>
+            </a:fontRef>
+          </p:style>
+          <p:txBody>
+            <a:bodyPr bIns="0" rtlCol="0" anchor="t" anchorCtr="0"/>
+            <a:lstStyle/>
+            <a:p>
+              <a:pPr algn="ctr" defTabSz="1219170">
+                <a:defRPr/>
+              </a:pPr>
+              <a:r>
+                <a:rPr lang="en-US" sz="1400" dirty="0">
+                  <a:solidFill>
+                    <a:srgbClr val="44546A"/>
+                  </a:solidFill>
+                  <a:effectLst>
+                    <a:outerShdw blurRad="38100" dist="38100" dir="2700000" algn="tl">
+                      <a:srgbClr val="000000">
+                        <a:alpha val="43137"/>
+                      </a:srgbClr>
+                    </a:outerShdw>
+                  </a:effectLst>
+                  <a:latin typeface="Calibri" panose="020F0502020204030204"/>
+                </a:rPr>
+                <a:t>Cloud-based</a:t>
+              </a:r>
+            </a:p>
+            <a:p>
+              <a:pPr algn="ctr" defTabSz="1219170">
+                <a:defRPr/>
+              </a:pPr>
+              <a:r>
+                <a:rPr lang="en-US" sz="1400" dirty="0">
+                  <a:solidFill>
+                    <a:srgbClr val="44546A"/>
+                  </a:solidFill>
+                  <a:effectLst>
+                    <a:outerShdw blurRad="38100" dist="38100" dir="2700000" algn="tl">
+                      <a:srgbClr val="000000">
+                        <a:alpha val="43137"/>
+                      </a:srgbClr>
+                    </a:outerShdw>
+                  </a:effectLst>
+                  <a:latin typeface="Calibri" panose="020F0502020204030204"/>
+                </a:rPr>
+                <a:t>proprietary services</a:t>
+              </a:r>
+            </a:p>
+          </p:txBody>
+        </p:sp>
+        <p:pic>
+          <p:nvPicPr>
+            <p:cNvPr id="57" name="Picture 33">
+              <a:extLst>
+                <a:ext uri="{FF2B5EF4-FFF2-40B4-BE49-F238E27FC236}">
+                  <a16:creationId xmlns:a16="http://schemas.microsoft.com/office/drawing/2014/main" id="{01B6EAAD-3AEF-5414-25EB-A7D3F218B48E}"/>
+                </a:ext>
+              </a:extLst>
+            </p:cNvPr>
+            <p:cNvPicPr>
+              <a:picLocks noChangeAspect="1"/>
+            </p:cNvPicPr>
+            <p:nvPr/>
+          </p:nvPicPr>
+          <p:blipFill>
+            <a:blip r:embed="rId8" cstate="print">
+              <a:extLst>
+                <a:ext uri="{28A0092B-C50C-407E-A947-70E740481C1C}">
+                  <a14:useLocalDpi xmlns:a14="http://schemas.microsoft.com/office/drawing/2010/main" val="0"/>
+                </a:ext>
+              </a:extLst>
+            </a:blip>
+            <a:stretch>
+              <a:fillRect/>
+            </a:stretch>
+          </p:blipFill>
+          <p:spPr>
+            <a:xfrm>
+              <a:off x="5860442" y="5011873"/>
+              <a:ext cx="468069" cy="428825"/>
+            </a:xfrm>
+            <a:prstGeom prst="rect">
+              <a:avLst/>
+            </a:prstGeom>
+          </p:spPr>
+        </p:pic>
+        <p:grpSp>
+          <p:nvGrpSpPr>
+            <p:cNvPr id="5" name="Gruppo 4">
+              <a:extLst>
+                <a:ext uri="{FF2B5EF4-FFF2-40B4-BE49-F238E27FC236}">
+                  <a16:creationId xmlns:a16="http://schemas.microsoft.com/office/drawing/2014/main" id="{04345518-7379-A2DC-3DCE-FED55FCAE891}"/>
+                </a:ext>
+              </a:extLst>
+            </p:cNvPr>
+            <p:cNvGrpSpPr/>
+            <p:nvPr/>
+          </p:nvGrpSpPr>
+          <p:grpSpPr>
+            <a:xfrm>
+              <a:off x="3050378" y="4455199"/>
+              <a:ext cx="1495115" cy="1817683"/>
+              <a:chOff x="6283022" y="775020"/>
+              <a:chExt cx="1495115" cy="1817683"/>
+            </a:xfrm>
+          </p:grpSpPr>
+          <p:sp>
+            <p:nvSpPr>
+              <p:cNvPr id="55" name="Left-Right Arrow 8">
+                <a:extLst>
+                  <a:ext uri="{FF2B5EF4-FFF2-40B4-BE49-F238E27FC236}">
+                    <a16:creationId xmlns:a16="http://schemas.microsoft.com/office/drawing/2014/main" id="{0C56BB87-E18A-FA97-96E9-78560D8C3694}"/>
+                  </a:ext>
+                </a:extLst>
+              </p:cNvPr>
+              <p:cNvSpPr/>
+              <p:nvPr/>
+            </p:nvSpPr>
+            <p:spPr>
+              <a:xfrm>
+                <a:off x="6283024" y="775020"/>
+                <a:ext cx="1495113" cy="913883"/>
+              </a:xfrm>
+              <a:prstGeom prst="leftRightArrow">
+                <a:avLst>
+                  <a:gd name="adj1" fmla="val 79822"/>
+                  <a:gd name="adj2" fmla="val 14767"/>
+                </a:avLst>
+              </a:prstGeom>
+              <a:solidFill>
+                <a:schemeClr val="tx2">
+                  <a:lumMod val="40000"/>
+                  <a:lumOff val="60000"/>
+                </a:schemeClr>
+              </a:solidFill>
+            </p:spPr>
+            <p:style>
+              <a:lnRef idx="2">
+                <a:schemeClr val="accent1">
+                  <a:shade val="50000"/>
+                </a:schemeClr>
+              </a:lnRef>
+              <a:fillRef idx="1">
+                <a:schemeClr val="accent1"/>
+              </a:fillRef>
+              <a:effectRef idx="0">
+                <a:schemeClr val="accent1"/>
+              </a:effectRef>
+              <a:fontRef idx="minor">
+                <a:schemeClr val="lt1"/>
+              </a:fontRef>
+            </p:style>
+            <p:txBody>
+              <a:bodyPr rtlCol="0" anchor="ctr"/>
+              <a:lstStyle/>
+              <a:p>
+                <a:pPr algn="ctr" defTabSz="1219170">
+                  <a:defRPr/>
+                </a:pPr>
+                <a:endParaRPr lang="en-US" sz="1100" dirty="0">
+                  <a:solidFill>
+                    <a:prstClr val="white"/>
+                  </a:solidFill>
+                  <a:latin typeface="Calibri" panose="020F0502020204030204"/>
+                </a:endParaRPr>
+              </a:p>
+            </p:txBody>
+          </p:sp>
+          <p:sp>
+            <p:nvSpPr>
+              <p:cNvPr id="58" name="Left-Right Arrow 8">
+                <a:extLst>
+                  <a:ext uri="{FF2B5EF4-FFF2-40B4-BE49-F238E27FC236}">
+                    <a16:creationId xmlns:a16="http://schemas.microsoft.com/office/drawing/2014/main" id="{247038BE-D6F1-50DF-ACBB-8AA1935F9D03}"/>
+                  </a:ext>
+                </a:extLst>
+              </p:cNvPr>
+              <p:cNvSpPr/>
+              <p:nvPr/>
+            </p:nvSpPr>
+            <p:spPr>
+              <a:xfrm>
+                <a:off x="6283023" y="1271911"/>
+                <a:ext cx="1495113" cy="913883"/>
+              </a:xfrm>
+              <a:prstGeom prst="leftRightArrow">
+                <a:avLst>
+                  <a:gd name="adj1" fmla="val 79822"/>
+                  <a:gd name="adj2" fmla="val 14767"/>
+                </a:avLst>
+              </a:prstGeom>
+              <a:solidFill>
+                <a:schemeClr val="tx2">
+                  <a:lumMod val="60000"/>
+                  <a:lumOff val="40000"/>
+                </a:schemeClr>
+              </a:solidFill>
+            </p:spPr>
+            <p:style>
+              <a:lnRef idx="2">
+                <a:schemeClr val="accent1">
+                  <a:shade val="50000"/>
+                </a:schemeClr>
+              </a:lnRef>
+              <a:fillRef idx="1">
+                <a:schemeClr val="accent1"/>
+              </a:fillRef>
+              <a:effectRef idx="0">
+                <a:schemeClr val="accent1"/>
+              </a:effectRef>
+              <a:fontRef idx="minor">
+                <a:schemeClr val="lt1"/>
+              </a:fontRef>
+            </p:style>
+            <p:txBody>
+              <a:bodyPr rtlCol="0" anchor="ctr"/>
+              <a:lstStyle/>
+              <a:p>
+                <a:pPr algn="ctr" defTabSz="1219170">
+                  <a:defRPr/>
+                </a:pPr>
+                <a:endParaRPr lang="en-US" sz="1100" dirty="0">
+                  <a:solidFill>
+                    <a:prstClr val="white"/>
+                  </a:solidFill>
+                  <a:latin typeface="Calibri" panose="020F0502020204030204"/>
+                </a:endParaRPr>
+              </a:p>
+            </p:txBody>
+          </p:sp>
+          <p:sp>
+            <p:nvSpPr>
+              <p:cNvPr id="59" name="Left-Right Arrow 8">
+                <a:extLst>
+                  <a:ext uri="{FF2B5EF4-FFF2-40B4-BE49-F238E27FC236}">
+                    <a16:creationId xmlns:a16="http://schemas.microsoft.com/office/drawing/2014/main" id="{96CFED16-F2BF-EF05-C460-E6F3AD0E4182}"/>
+                  </a:ext>
+                </a:extLst>
+              </p:cNvPr>
+              <p:cNvSpPr/>
+              <p:nvPr/>
+            </p:nvSpPr>
+            <p:spPr>
+              <a:xfrm>
+                <a:off x="6283022" y="1678820"/>
+                <a:ext cx="1495113" cy="913883"/>
+              </a:xfrm>
+              <a:prstGeom prst="leftRightArrow">
+                <a:avLst>
+                  <a:gd name="adj1" fmla="val 79822"/>
+                  <a:gd name="adj2" fmla="val 14767"/>
+                </a:avLst>
+              </a:prstGeom>
+            </p:spPr>
+            <p:style>
+              <a:lnRef idx="2">
+                <a:schemeClr val="accent1">
+                  <a:shade val="50000"/>
+                </a:schemeClr>
+              </a:lnRef>
+              <a:fillRef idx="1">
+                <a:schemeClr val="accent1"/>
+              </a:fillRef>
+              <a:effectRef idx="0">
+                <a:schemeClr val="accent1"/>
+              </a:effectRef>
+              <a:fontRef idx="minor">
+                <a:schemeClr val="lt1"/>
+              </a:fontRef>
+            </p:style>
+            <p:txBody>
+              <a:bodyPr rtlCol="0" anchor="ctr"/>
+              <a:lstStyle/>
+              <a:p>
+                <a:pPr algn="ctr" defTabSz="1219170">
+                  <a:defRPr/>
+                </a:pPr>
+                <a:r>
+                  <a:rPr lang="en-US" sz="1100" dirty="0" err="1">
+                    <a:solidFill>
+                      <a:prstClr val="white"/>
+                    </a:solidFill>
+                    <a:latin typeface="Calibri" panose="020F0502020204030204"/>
+                  </a:rPr>
+                  <a:t>Protocolli</a:t>
+                </a:r>
+                <a:r>
+                  <a:rPr lang="en-US" sz="1100" dirty="0">
+                    <a:solidFill>
+                      <a:prstClr val="white"/>
+                    </a:solidFill>
+                    <a:latin typeface="Calibri" panose="020F0502020204030204"/>
+                  </a:rPr>
+                  <a:t> </a:t>
+                </a:r>
+                <a:r>
+                  <a:rPr lang="en-US" sz="1100" dirty="0" err="1">
+                    <a:solidFill>
+                      <a:prstClr val="white"/>
+                    </a:solidFill>
+                    <a:latin typeface="Calibri" panose="020F0502020204030204"/>
+                  </a:rPr>
+                  <a:t>proprietari</a:t>
+                </a:r>
+                <a:r>
+                  <a:rPr lang="en-US" sz="1100" dirty="0">
+                    <a:solidFill>
+                      <a:prstClr val="white"/>
+                    </a:solidFill>
+                    <a:latin typeface="Calibri" panose="020F0502020204030204"/>
+                  </a:rPr>
+                  <a:t> via </a:t>
+                </a:r>
+                <a:r>
+                  <a:rPr lang="it-IT" sz="1100" b="0" i="0" u="none" strike="noStrike" baseline="0" dirty="0">
+                    <a:solidFill>
+                      <a:srgbClr val="FFFFFF"/>
+                    </a:solidFill>
+                    <a:latin typeface="Calibri" panose="020F0502020204030204" pitchFamily="34" charset="0"/>
+                  </a:rPr>
+                  <a:t>Bluetooth ®</a:t>
+                </a:r>
+                <a:endParaRPr lang="en-US" sz="1100" dirty="0">
+                  <a:solidFill>
+                    <a:prstClr val="white"/>
+                  </a:solidFill>
+                  <a:latin typeface="Calibri" panose="020F0502020204030204"/>
+                </a:endParaRPr>
+              </a:p>
+            </p:txBody>
+          </p:sp>
+        </p:grpSp>
+        <p:sp>
+          <p:nvSpPr>
+            <p:cNvPr id="63" name="Rounded Rectangle 10">
+              <a:extLst>
+                <a:ext uri="{FF2B5EF4-FFF2-40B4-BE49-F238E27FC236}">
+                  <a16:creationId xmlns:a16="http://schemas.microsoft.com/office/drawing/2014/main" id="{FFDCDD81-7159-B516-A8E0-9719DC9CEF42}"/>
+                </a:ext>
+              </a:extLst>
+            </p:cNvPr>
+            <p:cNvSpPr/>
+            <p:nvPr/>
+          </p:nvSpPr>
+          <p:spPr>
+            <a:xfrm>
+              <a:off x="8320414" y="4436050"/>
+              <a:ext cx="1955360" cy="2143821"/>
+            </a:xfrm>
+            <a:prstGeom prst="roundRect">
+              <a:avLst>
+                <a:gd name="adj" fmla="val 12253"/>
+              </a:avLst>
+            </a:prstGeom>
+            <a:solidFill>
+              <a:schemeClr val="tx1"/>
+            </a:solidFill>
+            <a:ln w="57150"/>
+          </p:spPr>
+          <p:style>
+            <a:lnRef idx="2">
+              <a:schemeClr val="accent1">
+                <a:shade val="50000"/>
+              </a:schemeClr>
+            </a:lnRef>
+            <a:fillRef idx="1">
+              <a:schemeClr val="accent1"/>
+            </a:fillRef>
+            <a:effectRef idx="0">
+              <a:schemeClr val="accent1"/>
+            </a:effectRef>
+            <a:fontRef idx="minor">
+              <a:schemeClr val="lt1"/>
+            </a:fontRef>
+          </p:style>
+          <p:txBody>
+            <a:bodyPr bIns="0" rtlCol="0" anchor="t" anchorCtr="0"/>
+            <a:lstStyle/>
+            <a:p>
+              <a:pPr algn="ctr" defTabSz="1219170">
+                <a:defRPr/>
+              </a:pPr>
+              <a:r>
+                <a:rPr lang="en-US" sz="1200" dirty="0" err="1">
+                  <a:solidFill>
+                    <a:schemeClr val="bg1"/>
+                  </a:solidFill>
+                  <a:latin typeface="+mj-lt"/>
+                </a:rPr>
+                <a:t>Servizi</a:t>
+              </a:r>
+              <a:r>
+                <a:rPr lang="en-US" sz="1200" dirty="0">
+                  <a:solidFill>
+                    <a:schemeClr val="bg1"/>
+                  </a:solidFill>
+                  <a:latin typeface="+mj-lt"/>
+                </a:rPr>
+                <a:t> in cloud </a:t>
+              </a:r>
+              <a:r>
+                <a:rPr lang="en-US" sz="1200" dirty="0" err="1">
+                  <a:solidFill>
+                    <a:schemeClr val="bg1"/>
+                  </a:solidFill>
+                  <a:latin typeface="+mj-lt"/>
+                </a:rPr>
+                <a:t>proprietari</a:t>
+              </a:r>
+              <a:endParaRPr lang="en-US" sz="1200" dirty="0">
+                <a:solidFill>
+                  <a:schemeClr val="bg1"/>
+                </a:solidFill>
+                <a:latin typeface="+mj-lt"/>
+              </a:endParaRPr>
+            </a:p>
+          </p:txBody>
+        </p:sp>
+        <p:grpSp>
+          <p:nvGrpSpPr>
+            <p:cNvPr id="6" name="Gruppo 5">
+              <a:extLst>
+                <a:ext uri="{FF2B5EF4-FFF2-40B4-BE49-F238E27FC236}">
+                  <a16:creationId xmlns:a16="http://schemas.microsoft.com/office/drawing/2014/main" id="{80CA5679-7798-0735-DBD8-B9166E8C6E52}"/>
+                </a:ext>
+              </a:extLst>
+            </p:cNvPr>
+            <p:cNvGrpSpPr/>
+            <p:nvPr/>
+          </p:nvGrpSpPr>
+          <p:grpSpPr>
+            <a:xfrm>
+              <a:off x="6575117" y="4468337"/>
+              <a:ext cx="1495115" cy="1817683"/>
+              <a:chOff x="6283022" y="775020"/>
+              <a:chExt cx="1495115" cy="1817683"/>
+            </a:xfrm>
+          </p:grpSpPr>
+          <p:sp>
+            <p:nvSpPr>
+              <p:cNvPr id="7" name="Left-Right Arrow 8">
+                <a:extLst>
+                  <a:ext uri="{FF2B5EF4-FFF2-40B4-BE49-F238E27FC236}">
+                    <a16:creationId xmlns:a16="http://schemas.microsoft.com/office/drawing/2014/main" id="{E7D4E6EB-735D-1D1A-F21E-4BA9ADFD177D}"/>
+                  </a:ext>
+                </a:extLst>
+              </p:cNvPr>
+              <p:cNvSpPr/>
+              <p:nvPr/>
+            </p:nvSpPr>
+            <p:spPr>
+              <a:xfrm>
+                <a:off x="6283024" y="775020"/>
+                <a:ext cx="1495113" cy="913883"/>
+              </a:xfrm>
+              <a:prstGeom prst="leftRightArrow">
+                <a:avLst>
+                  <a:gd name="adj1" fmla="val 79822"/>
+                  <a:gd name="adj2" fmla="val 14767"/>
+                </a:avLst>
+              </a:prstGeom>
+              <a:solidFill>
+                <a:schemeClr val="tx2">
+                  <a:lumMod val="40000"/>
+                  <a:lumOff val="60000"/>
+                </a:schemeClr>
+              </a:solidFill>
+            </p:spPr>
+            <p:style>
+              <a:lnRef idx="2">
+                <a:schemeClr val="accent1">
+                  <a:shade val="50000"/>
+                </a:schemeClr>
+              </a:lnRef>
+              <a:fillRef idx="1">
+                <a:schemeClr val="accent1"/>
+              </a:fillRef>
+              <a:effectRef idx="0">
+                <a:schemeClr val="accent1"/>
+              </a:effectRef>
+              <a:fontRef idx="minor">
+                <a:schemeClr val="lt1"/>
+              </a:fontRef>
+            </p:style>
+            <p:txBody>
+              <a:bodyPr rtlCol="0" anchor="ctr"/>
+              <a:lstStyle/>
+              <a:p>
+                <a:pPr algn="ctr" defTabSz="1219170">
+                  <a:defRPr/>
+                </a:pPr>
+                <a:endParaRPr lang="en-US" sz="1100" dirty="0">
+                  <a:solidFill>
+                    <a:prstClr val="white"/>
+                  </a:solidFill>
+                  <a:latin typeface="Calibri" panose="020F0502020204030204"/>
+                </a:endParaRPr>
+              </a:p>
+            </p:txBody>
+          </p:sp>
+          <p:sp>
+            <p:nvSpPr>
+              <p:cNvPr id="8" name="Left-Right Arrow 8">
+                <a:extLst>
+                  <a:ext uri="{FF2B5EF4-FFF2-40B4-BE49-F238E27FC236}">
+                    <a16:creationId xmlns:a16="http://schemas.microsoft.com/office/drawing/2014/main" id="{6A979E36-3D23-7D9E-EA33-EE1D5797B9ED}"/>
+                  </a:ext>
+                </a:extLst>
+              </p:cNvPr>
+              <p:cNvSpPr/>
+              <p:nvPr/>
+            </p:nvSpPr>
+            <p:spPr>
+              <a:xfrm>
+                <a:off x="6283023" y="1271911"/>
+                <a:ext cx="1495113" cy="913883"/>
+              </a:xfrm>
+              <a:prstGeom prst="leftRightArrow">
+                <a:avLst>
+                  <a:gd name="adj1" fmla="val 79822"/>
+                  <a:gd name="adj2" fmla="val 14767"/>
+                </a:avLst>
+              </a:prstGeom>
+              <a:solidFill>
+                <a:schemeClr val="tx2">
+                  <a:lumMod val="60000"/>
+                  <a:lumOff val="40000"/>
+                </a:schemeClr>
+              </a:solidFill>
+            </p:spPr>
+            <p:style>
+              <a:lnRef idx="2">
+                <a:schemeClr val="accent1">
+                  <a:shade val="50000"/>
+                </a:schemeClr>
+              </a:lnRef>
+              <a:fillRef idx="1">
+                <a:schemeClr val="accent1"/>
+              </a:fillRef>
+              <a:effectRef idx="0">
+                <a:schemeClr val="accent1"/>
+              </a:effectRef>
+              <a:fontRef idx="minor">
+                <a:schemeClr val="lt1"/>
+              </a:fontRef>
+            </p:style>
+            <p:txBody>
+              <a:bodyPr rtlCol="0" anchor="ctr"/>
+              <a:lstStyle/>
+              <a:p>
+                <a:pPr algn="ctr" defTabSz="1219170">
+                  <a:defRPr/>
+                </a:pPr>
+                <a:endParaRPr lang="en-US" sz="1100" dirty="0">
+                  <a:solidFill>
+                    <a:prstClr val="white"/>
+                  </a:solidFill>
+                  <a:latin typeface="Calibri" panose="020F0502020204030204"/>
+                </a:endParaRPr>
+              </a:p>
+            </p:txBody>
+          </p:sp>
+          <p:sp>
+            <p:nvSpPr>
+              <p:cNvPr id="9" name="Left-Right Arrow 8">
+                <a:extLst>
+                  <a:ext uri="{FF2B5EF4-FFF2-40B4-BE49-F238E27FC236}">
+                    <a16:creationId xmlns:a16="http://schemas.microsoft.com/office/drawing/2014/main" id="{2526BB73-9275-09F7-C740-43E12B75B858}"/>
+                  </a:ext>
+                </a:extLst>
+              </p:cNvPr>
+              <p:cNvSpPr/>
+              <p:nvPr/>
+            </p:nvSpPr>
+            <p:spPr>
+              <a:xfrm>
+                <a:off x="6283022" y="1678820"/>
+                <a:ext cx="1495113" cy="913883"/>
+              </a:xfrm>
+              <a:prstGeom prst="leftRightArrow">
+                <a:avLst>
+                  <a:gd name="adj1" fmla="val 79822"/>
+                  <a:gd name="adj2" fmla="val 14767"/>
+                </a:avLst>
+              </a:prstGeom>
+            </p:spPr>
+            <p:style>
+              <a:lnRef idx="2">
+                <a:schemeClr val="accent1">
+                  <a:shade val="50000"/>
+                </a:schemeClr>
+              </a:lnRef>
+              <a:fillRef idx="1">
+                <a:schemeClr val="accent1"/>
+              </a:fillRef>
+              <a:effectRef idx="0">
+                <a:schemeClr val="accent1"/>
+              </a:effectRef>
+              <a:fontRef idx="minor">
+                <a:schemeClr val="lt1"/>
+              </a:fontRef>
+            </p:style>
+            <p:txBody>
+              <a:bodyPr rtlCol="0" anchor="ctr"/>
+              <a:lstStyle/>
+              <a:p>
+                <a:pPr algn="ctr" defTabSz="1219170">
+                  <a:defRPr/>
+                </a:pPr>
+                <a:r>
+                  <a:rPr lang="en-US" sz="1100" dirty="0">
+                    <a:solidFill>
+                      <a:prstClr val="white"/>
+                    </a:solidFill>
+                    <a:latin typeface="Calibri" panose="020F0502020204030204"/>
+                  </a:rPr>
+                  <a:t>Upload e download </a:t>
+                </a:r>
+                <a:r>
+                  <a:rPr lang="en-US" sz="1100" dirty="0" err="1">
+                    <a:solidFill>
+                      <a:prstClr val="white"/>
+                    </a:solidFill>
+                    <a:latin typeface="Calibri" panose="020F0502020204030204"/>
+                  </a:rPr>
+                  <a:t>dati</a:t>
+                </a:r>
+                <a:r>
+                  <a:rPr lang="en-US" sz="1100" dirty="0">
+                    <a:solidFill>
+                      <a:prstClr val="white"/>
+                    </a:solidFill>
+                    <a:latin typeface="Calibri" panose="020F0502020204030204"/>
+                  </a:rPr>
+                  <a:t> </a:t>
+                </a:r>
+                <a:r>
+                  <a:rPr lang="en-US" sz="1100" dirty="0" err="1">
+                    <a:solidFill>
+                      <a:prstClr val="white"/>
+                    </a:solidFill>
+                    <a:latin typeface="Calibri" panose="020F0502020204030204"/>
+                  </a:rPr>
+                  <a:t>proprietari</a:t>
+                </a:r>
+                <a:endParaRPr lang="en-US" sz="1100" dirty="0">
+                  <a:solidFill>
+                    <a:prstClr val="white"/>
+                  </a:solidFill>
+                  <a:latin typeface="Calibri" panose="020F0502020204030204"/>
+                </a:endParaRPr>
+              </a:p>
+            </p:txBody>
+          </p:sp>
+        </p:grpSp>
+      </p:grpSp>
+      <p:pic>
+        <p:nvPicPr>
+          <p:cNvPr id="12" name="Segnaposto contenuto 11" descr="Nuvola con riempimento a tinta unita">
+            <a:extLst>
+              <a:ext uri="{FF2B5EF4-FFF2-40B4-BE49-F238E27FC236}">
+                <a16:creationId xmlns:a16="http://schemas.microsoft.com/office/drawing/2014/main" id="{C92DABD1-4272-51EC-EC21-B12A8232F66F}"/>
+              </a:ext>
+            </a:extLst>
+          </p:cNvPr>
+          <p:cNvPicPr>
+            <a:picLocks noGrp="1" noChangeAspect="1"/>
+          </p:cNvPicPr>
+          <p:nvPr>
+            <p:ph sz="quarter" idx="15"/>
+          </p:nvPr>
+        </p:nvPicPr>
+        <p:blipFill>
+          <a:blip r:embed="rId9">
+            <a:extLst>
+              <a:ext uri="{96DAC541-7B7A-43D3-8B79-37D633B846F1}">
+                <asvg:svgBlip xmlns:asvg="http://schemas.microsoft.com/office/drawing/2016/SVG/main" r:embed="rId10"/>
+              </a:ext>
+            </a:extLst>
+          </a:blip>
+          <a:stretch>
+            <a:fillRect/>
+          </a:stretch>
+        </p:blipFill>
+        <p:spPr>
+          <a:xfrm>
+            <a:off x="9132256" y="3869377"/>
+            <a:ext cx="914400" cy="914400"/>
+          </a:xfrm>
+        </p:spPr>
+      </p:pic>
+      <p:sp>
+        <p:nvSpPr>
+          <p:cNvPr id="3" name="Curved Left Arrow 10">
+            <a:extLst>
+              <a:ext uri="{FF2B5EF4-FFF2-40B4-BE49-F238E27FC236}">
+                <a16:creationId xmlns:a16="http://schemas.microsoft.com/office/drawing/2014/main" id="{6C466918-3CBF-F5A0-0E19-EEE7EED3DA17}"/>
+              </a:ext>
+            </a:extLst>
+          </p:cNvPr>
+          <p:cNvSpPr/>
+          <p:nvPr/>
+        </p:nvSpPr>
+        <p:spPr>
+          <a:xfrm>
+            <a:off x="10632718" y="4029371"/>
+            <a:ext cx="539552" cy="718582"/>
+          </a:xfrm>
+          <a:prstGeom prst="curvedLeftArrow">
+            <a:avLst/>
+          </a:prstGeom>
+          <a:solidFill>
+            <a:schemeClr val="tx2"/>
+          </a:solidFill>
+          <a:ln w="25400" cap="flat" cmpd="sng" algn="ctr">
+            <a:solidFill>
+              <a:schemeClr val="tx2">
+                <a:lumMod val="60000"/>
+                <a:lumOff val="40000"/>
+              </a:schemeClr>
+            </a:solidFill>
+            <a:prstDash val="solid"/>
+          </a:ln>
+          <a:effectLst/>
+        </p:spPr>
+        <p:style>
+          <a:lnRef idx="2">
+            <a:schemeClr val="accent1">
+              <a:shade val="50000"/>
+            </a:schemeClr>
+          </a:lnRef>
+          <a:fillRef idx="1">
+            <a:schemeClr val="accent1"/>
+          </a:fillRef>
+          <a:effectRef idx="0">
+            <a:schemeClr val="accent1"/>
+          </a:effectRef>
+          <a:fontRef idx="minor">
+            <a:schemeClr val="lt1"/>
+          </a:fontRef>
+        </p:style>
+        <p:txBody>
+          <a:bodyPr rtlCol="0" anchor="ctr"/>
+          <a:lstStyle/>
+          <a:p>
+            <a:pPr algn="ctr"/>
+            <a:endParaRPr lang="en-US">
+              <a:solidFill>
+                <a:schemeClr val="tx1"/>
+              </a:solidFill>
+            </a:endParaRPr>
           </a:p>
         </p:txBody>
       </p:sp>
       <p:sp>
         <p:nvSpPr>
-          <p:cNvPr id="3" name="Segnaposto contenuto 2">
+          <p:cNvPr id="4" name="Curved Left Arrow 10">
             <a:extLst>
               <a:ext uri="{FF2B5EF4-FFF2-40B4-BE49-F238E27FC236}">
-                <a16:creationId xmlns:a16="http://schemas.microsoft.com/office/drawing/2014/main" id="{DB097449-5B72-ADA0-3B2D-1CBC160D6B90}"/>
+                <a16:creationId xmlns:a16="http://schemas.microsoft.com/office/drawing/2014/main" id="{9FDC0EF2-8D07-4D3E-331D-9FA9958DD9EA}"/>
+              </a:ext>
+            </a:extLst>
+          </p:cNvPr>
+          <p:cNvSpPr/>
+          <p:nvPr/>
+        </p:nvSpPr>
+        <p:spPr>
+          <a:xfrm>
+            <a:off x="10604640" y="3751034"/>
+            <a:ext cx="539552" cy="718582"/>
+          </a:xfrm>
+          <a:prstGeom prst="curvedLeftArrow">
+            <a:avLst/>
+          </a:prstGeom>
+          <a:solidFill>
+            <a:schemeClr val="tx2">
+              <a:lumMod val="60000"/>
+              <a:lumOff val="40000"/>
+            </a:schemeClr>
+          </a:solidFill>
+          <a:ln w="25400" cap="flat" cmpd="sng" algn="ctr">
+            <a:solidFill>
+              <a:schemeClr val="tx2"/>
+            </a:solidFill>
+            <a:prstDash val="solid"/>
+          </a:ln>
+          <a:effectLst/>
+        </p:spPr>
+        <p:style>
+          <a:lnRef idx="2">
+            <a:schemeClr val="accent1">
+              <a:shade val="50000"/>
+            </a:schemeClr>
+          </a:lnRef>
+          <a:fillRef idx="1">
+            <a:schemeClr val="accent1"/>
+          </a:fillRef>
+          <a:effectRef idx="0">
+            <a:schemeClr val="accent1"/>
+          </a:effectRef>
+          <a:fontRef idx="minor">
+            <a:schemeClr val="lt1"/>
+          </a:fontRef>
+        </p:style>
+        <p:txBody>
+          <a:bodyPr rtlCol="0" anchor="ctr"/>
+          <a:lstStyle/>
+          <a:p>
+            <a:pPr algn="ctr"/>
+            <a:endParaRPr lang="en-US">
+              <a:solidFill>
+                <a:schemeClr val="tx1"/>
+              </a:solidFill>
+            </a:endParaRPr>
+          </a:p>
+        </p:txBody>
+      </p:sp>
+      <p:sp>
+        <p:nvSpPr>
+          <p:cNvPr id="10" name="Segnaposto numero diapositiva 9">
+            <a:extLst>
+              <a:ext uri="{FF2B5EF4-FFF2-40B4-BE49-F238E27FC236}">
+                <a16:creationId xmlns:a16="http://schemas.microsoft.com/office/drawing/2014/main" id="{AB771242-2AE6-7C4B-1244-63422EE7CADA}"/>
               </a:ext>
             </a:extLst>
           </p:cNvPr>
@@ -9906,115 +11303,23 @@
             <a:spLocks noGrp="1"/>
           </p:cNvSpPr>
           <p:nvPr>
-            <p:ph sz="quarter" idx="15"/>
+            <p:ph type="sldNum" sz="quarter" idx="12"/>
           </p:nvPr>
         </p:nvSpPr>
-        <p:spPr>
-          <a:xfrm>
-            <a:off x="594360" y="2676525"/>
-            <a:ext cx="4490827" cy="3597470"/>
-          </a:xfrm>
-        </p:spPr>
+        <p:spPr/>
         <p:txBody>
-          <a:bodyPr rtlCol="0"/>
-          <a:lstStyle>
-            <a:defPPr>
-              <a:defRPr lang="it-IT"/>
-            </a:defPPr>
-          </a:lstStyle>
+          <a:bodyPr/>
+          <a:lstStyle/>
           <a:p>
             <a:pPr rtl="0"/>
-            <a:r>
-              <a:rPr lang="it-IT" dirty="0"/>
-              <a:t>Questo è un potente strumento per l'arte oratoria. Ti aiuterà a variare l'intonazione, il tono e il volume per trasmettere emozioni, enfatizzare punti e mantenere l'interesse:</a:t>
-            </a:r>
-          </a:p>
-          <a:p>
-            <a:pPr lvl="1" rtl="0"/>
-            <a:r>
-              <a:rPr lang="it-IT" dirty="0"/>
-              <a:t>Variazione intonazione</a:t>
-            </a:r>
-          </a:p>
-          <a:p>
-            <a:pPr lvl="1" rtl="0"/>
-            <a:r>
-              <a:rPr lang="it-IT" dirty="0"/>
-              <a:t>Inflessione del tono</a:t>
-            </a:r>
-          </a:p>
-          <a:p>
-            <a:pPr lvl="1" rtl="0"/>
-            <a:r>
-              <a:rPr lang="it-IT" dirty="0"/>
-              <a:t>Controllo del volume</a:t>
-            </a:r>
-          </a:p>
-        </p:txBody>
-      </p:sp>
-      <p:sp>
-        <p:nvSpPr>
-          <p:cNvPr id="4" name="Segnaposto contenuto 3">
-            <a:extLst>
-              <a:ext uri="{FF2B5EF4-FFF2-40B4-BE49-F238E27FC236}">
-                <a16:creationId xmlns:a16="http://schemas.microsoft.com/office/drawing/2014/main" id="{41FC7B50-71A6-D8BE-C032-5EB4CF5706D5}"/>
-              </a:ext>
-            </a:extLst>
-          </p:cNvPr>
-          <p:cNvSpPr>
-            <a:spLocks noGrp="1"/>
-          </p:cNvSpPr>
-          <p:nvPr>
-            <p:ph sz="quarter" idx="16"/>
-          </p:nvPr>
-        </p:nvSpPr>
-        <p:spPr>
-          <a:xfrm>
-            <a:off x="5881898" y="2676525"/>
-            <a:ext cx="4490827" cy="3597470"/>
-          </a:xfrm>
-        </p:spPr>
-        <p:txBody>
-          <a:bodyPr rtlCol="0"/>
-          <a:lstStyle>
-            <a:defPPr>
-              <a:defRPr lang="it-IT"/>
-            </a:defPPr>
-          </a:lstStyle>
-          <a:p>
-            <a:pPr rtl="0"/>
-            <a:r>
-              <a:rPr lang="it-IT" dirty="0"/>
-              <a:t>Un linguaggio del corpo efficace valorizza il tuo messaggio, rendendolo più incisivo e memorabile:</a:t>
-            </a:r>
-          </a:p>
-          <a:p>
-            <a:pPr lvl="1" rtl="0"/>
-            <a:r>
-              <a:rPr lang="it-IT" dirty="0"/>
-              <a:t>Contatto visivo significativo</a:t>
-            </a:r>
-          </a:p>
-          <a:p>
-            <a:pPr lvl="1" rtl="0"/>
-            <a:r>
-              <a:rPr lang="it-IT" dirty="0"/>
-              <a:t>Movimenti intenzionali</a:t>
-            </a:r>
-          </a:p>
-          <a:p>
-            <a:pPr lvl="1" rtl="0"/>
-            <a:r>
-              <a:rPr lang="it-IT" dirty="0"/>
-              <a:t>Mantieni una buona postura</a:t>
-            </a:r>
-          </a:p>
-          <a:p>
-            <a:pPr lvl="1" rtl="0"/>
-            <a:r>
-              <a:rPr lang="it-IT" dirty="0"/>
-              <a:t>Controlla le espressioni</a:t>
-            </a:r>
+            <a:fld id="{294A09A9-5501-47C1-A89A-A340965A2BE2}" type="slidenum">
+              <a:rPr lang="it-IT" smtClean="0"/>
+              <a:pPr rtl="0"/>
+              <a:t>2</a:t>
+            </a:fld>
+            <a:endParaRPr lang="it-IT" dirty="0">
+              <a:latin typeface="+mn-lt"/>
+            </a:endParaRPr>
           </a:p>
         </p:txBody>
       </p:sp>
@@ -10053,7 +11358,7 @@
           <p:cNvPr id="2" name="Titolo 1">
             <a:extLst>
               <a:ext uri="{FF2B5EF4-FFF2-40B4-BE49-F238E27FC236}">
-                <a16:creationId xmlns:a16="http://schemas.microsoft.com/office/drawing/2014/main" id="{F810C1B7-6E4E-3DEE-50C0-1CA3B14303EE}"/>
+                <a16:creationId xmlns:a16="http://schemas.microsoft.com/office/drawing/2014/main" id="{7FBFBBBA-ED58-C5C3-11F4-296EDE8DB1E6}"/>
               </a:ext>
             </a:extLst>
           </p:cNvPr>
@@ -10061,13 +11366,329 @@
             <a:spLocks noGrp="1"/>
           </p:cNvSpPr>
           <p:nvPr>
-            <p:ph type="ctrTitle"/>
+            <p:ph type="title"/>
+          </p:nvPr>
+        </p:nvSpPr>
+        <p:spPr/>
+        <p:txBody>
+          <a:bodyPr/>
+          <a:lstStyle/>
+          <a:p>
+            <a:r>
+              <a:rPr lang="it-IT" dirty="0"/>
+              <a:t>La soluzione</a:t>
+            </a:r>
+          </a:p>
+        </p:txBody>
+      </p:sp>
+      <p:sp>
+        <p:nvSpPr>
+          <p:cNvPr id="3" name="Segnaposto contenuto 2">
+            <a:extLst>
+              <a:ext uri="{FF2B5EF4-FFF2-40B4-BE49-F238E27FC236}">
+                <a16:creationId xmlns:a16="http://schemas.microsoft.com/office/drawing/2014/main" id="{A074437C-C6DC-6C0D-6A49-D84539AFB00D}"/>
+              </a:ext>
+            </a:extLst>
+          </p:cNvPr>
+          <p:cNvSpPr>
+            <a:spLocks noGrp="1"/>
+          </p:cNvSpPr>
+          <p:nvPr>
+            <p:ph sz="quarter" idx="15"/>
+          </p:nvPr>
+        </p:nvSpPr>
+        <p:spPr/>
+        <p:txBody>
+          <a:bodyPr>
+            <a:normAutofit/>
+          </a:bodyPr>
+          <a:lstStyle/>
+          <a:p>
+            <a:r>
+              <a:rPr lang="it-IT" sz="1600" b="1" dirty="0"/>
+              <a:t>HL7 FHIR</a:t>
+            </a:r>
+          </a:p>
+          <a:p>
+            <a:pPr marL="342900" indent="-342900">
+              <a:buFont typeface="Arial" panose="020B0604020202020204" pitchFamily="34" charset="0"/>
+              <a:buChar char="•"/>
+            </a:pPr>
+            <a:r>
+              <a:rPr lang="it-IT" sz="1600" dirty="0"/>
+              <a:t>Linguaggio a livello di applicazione per ottenere l'interoperabilità dei dati sanitari. </a:t>
+            </a:r>
+          </a:p>
+          <a:p>
+            <a:pPr marL="342900" indent="-342900">
+              <a:buFont typeface="Arial" panose="020B0604020202020204" pitchFamily="34" charset="0"/>
+              <a:buChar char="•"/>
+            </a:pPr>
+            <a:r>
+              <a:rPr lang="it-IT" sz="1600" dirty="0"/>
+              <a:t>Non risolve ancora la diversità di comunicazione dei dispositivi di salute personale, ed è qui che entra in gioco ACOM</a:t>
+            </a:r>
+          </a:p>
+          <a:p>
+            <a:endParaRPr lang="it-IT" sz="1600" b="1" dirty="0"/>
+          </a:p>
+        </p:txBody>
+      </p:sp>
+      <p:sp>
+        <p:nvSpPr>
+          <p:cNvPr id="4" name="Segnaposto contenuto 3">
+            <a:extLst>
+              <a:ext uri="{FF2B5EF4-FFF2-40B4-BE49-F238E27FC236}">
+                <a16:creationId xmlns:a16="http://schemas.microsoft.com/office/drawing/2014/main" id="{0F865E98-3896-E174-8D9E-73E3D9AB91DC}"/>
+              </a:ext>
+            </a:extLst>
+          </p:cNvPr>
+          <p:cNvSpPr>
+            <a:spLocks noGrp="1"/>
+          </p:cNvSpPr>
+          <p:nvPr>
+            <p:ph sz="quarter" idx="16"/>
+          </p:nvPr>
+        </p:nvSpPr>
+        <p:spPr/>
+        <p:txBody>
+          <a:bodyPr>
+            <a:normAutofit/>
+          </a:bodyPr>
+          <a:lstStyle/>
+          <a:p>
+            <a:r>
+              <a:rPr lang="it-IT" sz="1600" b="1" dirty="0"/>
+              <a:t>IEEE 11073-10206 ACOM</a:t>
+            </a:r>
+          </a:p>
+          <a:p>
+            <a:pPr marL="342900" indent="-342900">
+              <a:buFont typeface="Arial" panose="020B0604020202020204" pitchFamily="34" charset="0"/>
+              <a:buChar char="•"/>
+            </a:pPr>
+            <a:r>
+              <a:rPr lang="it-IT" sz="1600" dirty="0"/>
+              <a:t>ACOM sta per «Abstract Content Model»</a:t>
+            </a:r>
+          </a:p>
+          <a:p>
+            <a:pPr marL="342900" indent="-342900">
+              <a:buFont typeface="Arial" panose="020B0604020202020204" pitchFamily="34" charset="0"/>
+              <a:buChar char="•"/>
+            </a:pPr>
+            <a:r>
+              <a:rPr lang="it-IT" sz="1600" dirty="0"/>
+              <a:t>ACOM definisce un modello basato sullo standard IEEE 11073 per la comunicazione dei dispositivi medici</a:t>
+            </a:r>
+          </a:p>
+          <a:p>
+            <a:pPr marL="342900" indent="-342900">
+              <a:buFont typeface="Arial" panose="020B0604020202020204" pitchFamily="34" charset="0"/>
+              <a:buChar char="•"/>
+            </a:pPr>
+            <a:r>
+              <a:rPr lang="it-IT" sz="1600" dirty="0"/>
+              <a:t>Gli oggetti e gli attributi di ACOM sono mappati </a:t>
+            </a:r>
+            <a:r>
+              <a:rPr lang="it-IT" sz="1600" b="1" dirty="0"/>
+              <a:t>1 a 1</a:t>
+            </a:r>
+            <a:r>
+              <a:rPr lang="it-IT" sz="1600" dirty="0"/>
+              <a:t> alle risorse HL7 FHIR</a:t>
+            </a:r>
+            <a:endParaRPr lang="it-IT" sz="1600" b="1" dirty="0"/>
+          </a:p>
+        </p:txBody>
+      </p:sp>
+      <p:pic>
+        <p:nvPicPr>
+          <p:cNvPr id="6" name="Picture 2" descr="FHIR and the Real Challenge of Health Data ...">
+            <a:extLst>
+              <a:ext uri="{FF2B5EF4-FFF2-40B4-BE49-F238E27FC236}">
+                <a16:creationId xmlns:a16="http://schemas.microsoft.com/office/drawing/2014/main" id="{7CC15EDF-1016-FD1E-0048-5341C48C1F16}"/>
+              </a:ext>
+            </a:extLst>
+          </p:cNvPr>
+          <p:cNvPicPr>
+            <a:picLocks noChangeAspect="1" noChangeArrowheads="1"/>
+          </p:cNvPicPr>
+          <p:nvPr/>
+        </p:nvPicPr>
+        <p:blipFill>
+          <a:blip r:embed="rId2" cstate="print">
+            <a:clrChange>
+              <a:clrFrom>
+                <a:srgbClr val="FFFFFF"/>
+              </a:clrFrom>
+              <a:clrTo>
+                <a:srgbClr val="FFFFFF">
+                  <a:alpha val="0"/>
+                </a:srgbClr>
+              </a:clrTo>
+            </a:clrChange>
+            <a:extLst>
+              <a:ext uri="{28A0092B-C50C-407E-A947-70E740481C1C}">
+                <a14:useLocalDpi xmlns:a14="http://schemas.microsoft.com/office/drawing/2010/main" val="0"/>
+              </a:ext>
+            </a:extLst>
+          </a:blip>
+          <a:srcRect/>
+          <a:stretch>
+            <a:fillRect/>
+          </a:stretch>
+        </p:blipFill>
+        <p:spPr bwMode="auto">
+          <a:xfrm>
+            <a:off x="594359" y="5565217"/>
+            <a:ext cx="1513179" cy="708778"/>
+          </a:xfrm>
+          <a:prstGeom prst="rect">
+            <a:avLst/>
+          </a:prstGeom>
+          <a:noFill/>
+          <a:extLst>
+            <a:ext uri="{909E8E84-426E-40DD-AFC4-6F175D3DCCD1}">
+              <a14:hiddenFill xmlns:a14="http://schemas.microsoft.com/office/drawing/2010/main">
+                <a:solidFill>
+                  <a:srgbClr val="FFFFFF"/>
+                </a:solidFill>
+              </a14:hiddenFill>
+            </a:ext>
+          </a:extLst>
+        </p:spPr>
+      </p:pic>
+      <p:pic>
+        <p:nvPicPr>
+          <p:cNvPr id="7" name="Content Placeholder 4" descr="Icon&#10;&#10;Description automatically generated">
+            <a:extLst>
+              <a:ext uri="{FF2B5EF4-FFF2-40B4-BE49-F238E27FC236}">
+                <a16:creationId xmlns:a16="http://schemas.microsoft.com/office/drawing/2014/main" id="{10A4B3F2-9790-A176-8B5A-9FAFFF7752DE}"/>
+              </a:ext>
+            </a:extLst>
+          </p:cNvPr>
+          <p:cNvPicPr>
+            <a:picLocks noChangeAspect="1"/>
+          </p:cNvPicPr>
+          <p:nvPr/>
+        </p:nvPicPr>
+        <p:blipFill>
+          <a:blip r:embed="rId3">
+            <a:clrChange>
+              <a:clrFrom>
+                <a:srgbClr val="FFFFFF"/>
+              </a:clrFrom>
+              <a:clrTo>
+                <a:srgbClr val="FFFFFF">
+                  <a:alpha val="0"/>
+                </a:srgbClr>
+              </a:clrTo>
+            </a:clrChange>
+            <a:extLst>
+              <a:ext uri="{28A0092B-C50C-407E-A947-70E740481C1C}">
+                <a14:useLocalDpi xmlns:a14="http://schemas.microsoft.com/office/drawing/2010/main" val="0"/>
+              </a:ext>
+            </a:extLst>
+          </a:blip>
+          <a:stretch>
+            <a:fillRect/>
+          </a:stretch>
+        </p:blipFill>
+        <p:spPr>
+          <a:xfrm>
+            <a:off x="8859545" y="5677650"/>
+            <a:ext cx="1513180" cy="483911"/>
+          </a:xfrm>
+          <a:prstGeom prst="rect">
+            <a:avLst/>
+          </a:prstGeom>
+        </p:spPr>
+      </p:pic>
+      <p:sp>
+        <p:nvSpPr>
+          <p:cNvPr id="5" name="Segnaposto numero diapositiva 4">
+            <a:extLst>
+              <a:ext uri="{FF2B5EF4-FFF2-40B4-BE49-F238E27FC236}">
+                <a16:creationId xmlns:a16="http://schemas.microsoft.com/office/drawing/2014/main" id="{E342E31C-47FE-08AD-D5F9-44ACD71819F1}"/>
+              </a:ext>
+            </a:extLst>
+          </p:cNvPr>
+          <p:cNvSpPr>
+            <a:spLocks noGrp="1"/>
+          </p:cNvSpPr>
+          <p:nvPr>
+            <p:ph type="sldNum" sz="quarter" idx="12"/>
+          </p:nvPr>
+        </p:nvSpPr>
+        <p:spPr/>
+        <p:txBody>
+          <a:bodyPr/>
+          <a:lstStyle/>
+          <a:p>
+            <a:pPr rtl="0"/>
+            <a:fld id="{294A09A9-5501-47C1-A89A-A340965A2BE2}" type="slidenum">
+              <a:rPr lang="it-IT" smtClean="0"/>
+              <a:pPr rtl="0"/>
+              <a:t>3</a:t>
+            </a:fld>
+            <a:endParaRPr lang="it-IT" dirty="0">
+              <a:latin typeface="+mn-lt"/>
+            </a:endParaRPr>
+          </a:p>
+        </p:txBody>
+      </p:sp>
+    </p:spTree>
+    <p:extLst>
+      <p:ext uri="{BB962C8B-B14F-4D97-AF65-F5344CB8AC3E}">
+        <p14:creationId xmlns:p14="http://schemas.microsoft.com/office/powerpoint/2010/main" val="1625547966"/>
+      </p:ext>
+    </p:extLst>
+  </p:cSld>
+  <p:clrMapOvr>
+    <a:masterClrMapping/>
+  </p:clrMapOvr>
+</p:sld>
+</file>
+
+<file path=ppt/slides/slide4.xml><?xml version="1.0" encoding="utf-8"?>
+<p:sld xmlns:a="http://schemas.openxmlformats.org/drawingml/2006/main" xmlns:r="http://schemas.openxmlformats.org/officeDocument/2006/relationships" xmlns:p="http://schemas.openxmlformats.org/presentationml/2006/main">
+  <p:cSld>
+    <p:spTree>
+      <p:nvGrpSpPr>
+        <p:cNvPr id="1" name=""/>
+        <p:cNvGrpSpPr/>
+        <p:nvPr/>
+      </p:nvGrpSpPr>
+      <p:grpSpPr>
+        <a:xfrm>
+          <a:off x="0" y="0"/>
+          <a:ext cx="0" cy="0"/>
+          <a:chOff x="0" y="0"/>
+          <a:chExt cx="0" cy="0"/>
+        </a:xfrm>
+      </p:grpSpPr>
+      <p:sp>
+        <p:nvSpPr>
+          <p:cNvPr id="2" name="Titolo 1">
+            <a:extLst>
+              <a:ext uri="{FF2B5EF4-FFF2-40B4-BE49-F238E27FC236}">
+                <a16:creationId xmlns:a16="http://schemas.microsoft.com/office/drawing/2014/main" id="{805346ED-721D-85EE-2F1B-A31D0912DE29}"/>
+              </a:ext>
+            </a:extLst>
+          </p:cNvPr>
+          <p:cNvSpPr>
+            <a:spLocks noGrp="1"/>
+          </p:cNvSpPr>
+          <p:nvPr>
+            <p:ph type="title"/>
           </p:nvPr>
         </p:nvSpPr>
         <p:spPr>
           <a:xfrm>
-            <a:off x="594360" y="411479"/>
-            <a:ext cx="5486400" cy="3291840"/>
+            <a:off x="594360" y="278129"/>
+            <a:ext cx="9778365" cy="1494596"/>
           </a:xfrm>
         </p:spPr>
         <p:txBody>
@@ -10080,18 +11701,873 @@
           <a:p>
             <a:pPr rtl="0"/>
             <a:r>
-              <a:rPr lang="it-IT"/>
-              <a:t>Grazie</a:t>
+              <a:rPr lang="it-IT" dirty="0"/>
+              <a:t>La soluzione</a:t>
             </a:r>
+          </a:p>
+        </p:txBody>
+      </p:sp>
+      <p:grpSp>
+        <p:nvGrpSpPr>
+          <p:cNvPr id="14" name="Gruppo 13">
+            <a:extLst>
+              <a:ext uri="{FF2B5EF4-FFF2-40B4-BE49-F238E27FC236}">
+                <a16:creationId xmlns:a16="http://schemas.microsoft.com/office/drawing/2014/main" id="{313FE5FD-1129-8C82-F9AA-3228203F974A}"/>
+              </a:ext>
+            </a:extLst>
+          </p:cNvPr>
+          <p:cNvGrpSpPr/>
+          <p:nvPr/>
+        </p:nvGrpSpPr>
+        <p:grpSpPr>
+          <a:xfrm>
+            <a:off x="1117600" y="2978259"/>
+            <a:ext cx="9344210" cy="2148427"/>
+            <a:chOff x="691309" y="4287525"/>
+            <a:chExt cx="9344210" cy="2148427"/>
+          </a:xfrm>
+        </p:grpSpPr>
+        <p:pic>
+          <p:nvPicPr>
+            <p:cNvPr id="45" name="Picture 19">
+              <a:extLst>
+                <a:ext uri="{FF2B5EF4-FFF2-40B4-BE49-F238E27FC236}">
+                  <a16:creationId xmlns:a16="http://schemas.microsoft.com/office/drawing/2014/main" id="{D7322607-D44B-0DC0-2921-4EEC1AF711AA}"/>
+                </a:ext>
+              </a:extLst>
+            </p:cNvPr>
+            <p:cNvPicPr>
+              <a:picLocks noChangeAspect="1"/>
+            </p:cNvPicPr>
+            <p:nvPr/>
+          </p:nvPicPr>
+          <p:blipFill rotWithShape="1">
+            <a:blip r:embed="rId3">
+              <a:clrChange>
+                <a:clrFrom>
+                  <a:srgbClr val="FFFFFC"/>
+                </a:clrFrom>
+                <a:clrTo>
+                  <a:srgbClr val="FFFFFC">
+                    <a:alpha val="0"/>
+                  </a:srgbClr>
+                </a:clrTo>
+              </a:clrChange>
+            </a:blip>
+            <a:srcRect t="6671" r="10925" b="23243"/>
+            <a:stretch/>
+          </p:blipFill>
+          <p:spPr>
+            <a:xfrm>
+              <a:off x="1254123" y="4855769"/>
+              <a:ext cx="716899" cy="731647"/>
+            </a:xfrm>
+            <a:prstGeom prst="rect">
+              <a:avLst/>
+            </a:prstGeom>
+          </p:spPr>
+        </p:pic>
+        <p:pic>
+          <p:nvPicPr>
+            <p:cNvPr id="46" name="Picture 20" descr="Afbeeldingsresultaat voor a&amp;d medical blood pressure monitor">
+              <a:extLst>
+                <a:ext uri="{FF2B5EF4-FFF2-40B4-BE49-F238E27FC236}">
+                  <a16:creationId xmlns:a16="http://schemas.microsoft.com/office/drawing/2014/main" id="{50C5A6B4-10E1-91FD-8ED8-6855A5A44C21}"/>
+                </a:ext>
+              </a:extLst>
+            </p:cNvPr>
+            <p:cNvPicPr>
+              <a:picLocks noChangeAspect="1" noChangeArrowheads="1"/>
+            </p:cNvPicPr>
+            <p:nvPr/>
+          </p:nvPicPr>
+          <p:blipFill>
+            <a:blip r:embed="rId4" cstate="print">
+              <a:clrChange>
+                <a:clrFrom>
+                  <a:srgbClr val="FFFFFF"/>
+                </a:clrFrom>
+                <a:clrTo>
+                  <a:srgbClr val="FFFFFF">
+                    <a:alpha val="0"/>
+                  </a:srgbClr>
+                </a:clrTo>
+              </a:clrChange>
+              <a:extLst>
+                <a:ext uri="{28A0092B-C50C-407E-A947-70E740481C1C}">
+                  <a14:useLocalDpi xmlns:a14="http://schemas.microsoft.com/office/drawing/2010/main" val="0"/>
+                </a:ext>
+              </a:extLst>
+            </a:blip>
+            <a:srcRect/>
+            <a:stretch>
+              <a:fillRect/>
+            </a:stretch>
+          </p:blipFill>
+          <p:spPr bwMode="auto">
+            <a:xfrm>
+              <a:off x="743736" y="5517330"/>
+              <a:ext cx="1153321" cy="790932"/>
+            </a:xfrm>
+            <a:prstGeom prst="rect">
+              <a:avLst/>
+            </a:prstGeom>
+            <a:noFill/>
+            <a:extLst>
+              <a:ext uri="{909E8E84-426E-40DD-AFC4-6F175D3DCCD1}">
+                <a14:hiddenFill xmlns:a14="http://schemas.microsoft.com/office/drawing/2010/main">
+                  <a:solidFill>
+                    <a:srgbClr val="FFFFFF"/>
+                  </a:solidFill>
+                </a14:hiddenFill>
+              </a:ext>
+            </a:extLst>
+          </p:spPr>
+        </p:pic>
+        <p:pic>
+          <p:nvPicPr>
+            <p:cNvPr id="47" name="Picture 6" descr="Afbeeldingsresultaat voor polar bluetooth weight scale">
+              <a:extLst>
+                <a:ext uri="{FF2B5EF4-FFF2-40B4-BE49-F238E27FC236}">
+                  <a16:creationId xmlns:a16="http://schemas.microsoft.com/office/drawing/2014/main" id="{27D2B326-B6EE-357F-39FF-AFA97A757EF2}"/>
+                </a:ext>
+              </a:extLst>
+            </p:cNvPr>
+            <p:cNvPicPr>
+              <a:picLocks noChangeAspect="1" noChangeArrowheads="1"/>
+            </p:cNvPicPr>
+            <p:nvPr/>
+          </p:nvPicPr>
+          <p:blipFill>
+            <a:blip r:embed="rId5" cstate="print">
+              <a:clrChange>
+                <a:clrFrom>
+                  <a:srgbClr val="FFFFFF"/>
+                </a:clrFrom>
+                <a:clrTo>
+                  <a:srgbClr val="FFFFFF">
+                    <a:alpha val="0"/>
+                  </a:srgbClr>
+                </a:clrTo>
+              </a:clrChange>
+              <a:extLst>
+                <a:ext uri="{28A0092B-C50C-407E-A947-70E740481C1C}">
+                  <a14:useLocalDpi xmlns:a14="http://schemas.microsoft.com/office/drawing/2010/main" val="0"/>
+                </a:ext>
+              </a:extLst>
+            </a:blip>
+            <a:srcRect/>
+            <a:stretch>
+              <a:fillRect/>
+            </a:stretch>
+          </p:blipFill>
+          <p:spPr bwMode="auto">
+            <a:xfrm>
+              <a:off x="1897057" y="5374612"/>
+              <a:ext cx="979705" cy="947090"/>
+            </a:xfrm>
+            <a:prstGeom prst="rect">
+              <a:avLst/>
+            </a:prstGeom>
+            <a:noFill/>
+            <a:extLst>
+              <a:ext uri="{909E8E84-426E-40DD-AFC4-6F175D3DCCD1}">
+                <a14:hiddenFill xmlns:a14="http://schemas.microsoft.com/office/drawing/2010/main">
+                  <a:solidFill>
+                    <a:srgbClr val="FFFFFF"/>
+                  </a:solidFill>
+                </a14:hiddenFill>
+              </a:ext>
+            </a:extLst>
+          </p:spPr>
+        </p:pic>
+        <p:pic>
+          <p:nvPicPr>
+            <p:cNvPr id="48" name="Picture 22">
+              <a:extLst>
+                <a:ext uri="{FF2B5EF4-FFF2-40B4-BE49-F238E27FC236}">
+                  <a16:creationId xmlns:a16="http://schemas.microsoft.com/office/drawing/2014/main" id="{675BC08B-759B-47D6-3853-0D95F70EE40C}"/>
+                </a:ext>
+              </a:extLst>
+            </p:cNvPr>
+            <p:cNvPicPr>
+              <a:picLocks noChangeAspect="1"/>
+            </p:cNvPicPr>
+            <p:nvPr/>
+          </p:nvPicPr>
+          <p:blipFill>
+            <a:blip r:embed="rId6" cstate="print">
+              <a:extLst>
+                <a:ext uri="{28A0092B-C50C-407E-A947-70E740481C1C}">
+                  <a14:useLocalDpi xmlns:a14="http://schemas.microsoft.com/office/drawing/2010/main" val="0"/>
+                </a:ext>
+              </a:extLst>
+            </a:blip>
+            <a:stretch>
+              <a:fillRect/>
+            </a:stretch>
+          </p:blipFill>
+          <p:spPr>
+            <a:xfrm>
+              <a:off x="4706869" y="5329857"/>
+              <a:ext cx="1122595" cy="833062"/>
+            </a:xfrm>
+            <a:prstGeom prst="rect">
+              <a:avLst/>
+            </a:prstGeom>
+          </p:spPr>
+        </p:pic>
+        <p:sp>
+          <p:nvSpPr>
+            <p:cNvPr id="49" name="Rounded Rectangle 9">
+              <a:extLst>
+                <a:ext uri="{FF2B5EF4-FFF2-40B4-BE49-F238E27FC236}">
+                  <a16:creationId xmlns:a16="http://schemas.microsoft.com/office/drawing/2014/main" id="{594C1D3C-6011-8580-05EB-E5544975C781}"/>
+                </a:ext>
+              </a:extLst>
+            </p:cNvPr>
+            <p:cNvSpPr/>
+            <p:nvPr/>
+          </p:nvSpPr>
+          <p:spPr>
+            <a:xfrm>
+              <a:off x="691309" y="4292131"/>
+              <a:ext cx="2298117" cy="2143821"/>
+            </a:xfrm>
+            <a:prstGeom prst="roundRect">
+              <a:avLst>
+                <a:gd name="adj" fmla="val 12253"/>
+              </a:avLst>
+            </a:prstGeom>
+            <a:noFill/>
+            <a:ln w="57150"/>
+          </p:spPr>
+          <p:style>
+            <a:lnRef idx="2">
+              <a:schemeClr val="accent1">
+                <a:shade val="50000"/>
+              </a:schemeClr>
+            </a:lnRef>
+            <a:fillRef idx="1">
+              <a:schemeClr val="accent1"/>
+            </a:fillRef>
+            <a:effectRef idx="0">
+              <a:schemeClr val="accent1"/>
+            </a:effectRef>
+            <a:fontRef idx="minor">
+              <a:schemeClr val="lt1"/>
+            </a:fontRef>
+          </p:style>
+          <p:txBody>
+            <a:bodyPr bIns="0" rtlCol="0" anchor="t" anchorCtr="0"/>
+            <a:lstStyle/>
+            <a:p>
+              <a:pPr algn="ctr" defTabSz="1219170">
+                <a:defRPr/>
+              </a:pPr>
+              <a:r>
+                <a:rPr lang="en-US" sz="1200" dirty="0" err="1">
+                  <a:solidFill>
+                    <a:schemeClr val="bg1"/>
+                  </a:solidFill>
+                  <a:latin typeface="+mj-lt"/>
+                </a:rPr>
+                <a:t>Dispositivi</a:t>
+              </a:r>
+              <a:r>
+                <a:rPr lang="en-US" sz="1200" dirty="0">
+                  <a:solidFill>
+                    <a:schemeClr val="bg1"/>
+                  </a:solidFill>
+                  <a:latin typeface="+mj-lt"/>
+                </a:rPr>
+                <a:t> </a:t>
+              </a:r>
+              <a:r>
+                <a:rPr lang="en-US" sz="1200" dirty="0" err="1">
+                  <a:solidFill>
+                    <a:schemeClr val="bg1"/>
+                  </a:solidFill>
+                  <a:latin typeface="+mj-lt"/>
+                </a:rPr>
+                <a:t>rilevamento</a:t>
+              </a:r>
+              <a:r>
+                <a:rPr lang="en-US" sz="1200" dirty="0">
+                  <a:solidFill>
+                    <a:schemeClr val="bg1"/>
+                  </a:solidFill>
+                  <a:latin typeface="+mj-lt"/>
+                </a:rPr>
+                <a:t> salute </a:t>
+              </a:r>
+              <a:r>
+                <a:rPr lang="en-US" sz="1200" dirty="0" err="1">
+                  <a:solidFill>
+                    <a:schemeClr val="bg1"/>
+                  </a:solidFill>
+                  <a:latin typeface="+mj-lt"/>
+                </a:rPr>
+                <a:t>personale</a:t>
+              </a:r>
+              <a:endParaRPr lang="en-US" sz="1200" dirty="0">
+                <a:solidFill>
+                  <a:schemeClr val="bg1"/>
+                </a:solidFill>
+                <a:latin typeface="+mj-lt"/>
+              </a:endParaRPr>
+            </a:p>
+          </p:txBody>
+        </p:sp>
+        <p:sp>
+          <p:nvSpPr>
+            <p:cNvPr id="50" name="Rounded Rectangle 10">
+              <a:extLst>
+                <a:ext uri="{FF2B5EF4-FFF2-40B4-BE49-F238E27FC236}">
+                  <a16:creationId xmlns:a16="http://schemas.microsoft.com/office/drawing/2014/main" id="{A39C87CE-B099-D02F-B842-A19989605D80}"/>
+                </a:ext>
+              </a:extLst>
+            </p:cNvPr>
+            <p:cNvSpPr/>
+            <p:nvPr/>
+          </p:nvSpPr>
+          <p:spPr>
+            <a:xfrm>
+              <a:off x="4606443" y="4483665"/>
+              <a:ext cx="1863541" cy="1795057"/>
+            </a:xfrm>
+            <a:prstGeom prst="roundRect">
+              <a:avLst>
+                <a:gd name="adj" fmla="val 12253"/>
+              </a:avLst>
+            </a:prstGeom>
+            <a:noFill/>
+            <a:ln w="57150"/>
+          </p:spPr>
+          <p:style>
+            <a:lnRef idx="2">
+              <a:schemeClr val="accent1">
+                <a:shade val="50000"/>
+              </a:schemeClr>
+            </a:lnRef>
+            <a:fillRef idx="1">
+              <a:schemeClr val="accent1"/>
+            </a:fillRef>
+            <a:effectRef idx="0">
+              <a:schemeClr val="accent1"/>
+            </a:effectRef>
+            <a:fontRef idx="minor">
+              <a:schemeClr val="lt1"/>
+            </a:fontRef>
+          </p:style>
+          <p:txBody>
+            <a:bodyPr bIns="0" rtlCol="0" anchor="t" anchorCtr="0"/>
+            <a:lstStyle/>
+            <a:p>
+              <a:pPr algn="ctr" defTabSz="1219170">
+                <a:defRPr/>
+              </a:pPr>
+              <a:r>
+                <a:rPr lang="en-US" sz="1200" dirty="0">
+                  <a:solidFill>
+                    <a:schemeClr val="bg1"/>
+                  </a:solidFill>
+                  <a:latin typeface="+mj-lt"/>
+                </a:rPr>
+                <a:t>App </a:t>
+              </a:r>
+              <a:r>
+                <a:rPr lang="en-US" sz="1200" dirty="0" err="1">
+                  <a:solidFill>
+                    <a:schemeClr val="bg1"/>
+                  </a:solidFill>
+                  <a:latin typeface="+mj-lt"/>
+                </a:rPr>
+                <a:t>generica</a:t>
+              </a:r>
+              <a:r>
+                <a:rPr lang="en-US" sz="1200" dirty="0">
+                  <a:solidFill>
+                    <a:schemeClr val="bg1"/>
+                  </a:solidFill>
+                  <a:latin typeface="+mj-lt"/>
+                </a:rPr>
+                <a:t> e </a:t>
+              </a:r>
+              <a:r>
+                <a:rPr lang="en-US" sz="1200" dirty="0" err="1">
+                  <a:solidFill>
+                    <a:schemeClr val="bg1"/>
+                  </a:solidFill>
+                  <a:latin typeface="+mj-lt"/>
+                </a:rPr>
+                <a:t>dispositivi</a:t>
+              </a:r>
+              <a:r>
+                <a:rPr lang="en-US" sz="1200" dirty="0">
+                  <a:solidFill>
+                    <a:schemeClr val="bg1"/>
+                  </a:solidFill>
+                  <a:latin typeface="+mj-lt"/>
+                </a:rPr>
+                <a:t> gateway </a:t>
+              </a:r>
+            </a:p>
+          </p:txBody>
+        </p:sp>
+        <p:pic>
+          <p:nvPicPr>
+            <p:cNvPr id="51" name="Picture 25">
+              <a:extLst>
+                <a:ext uri="{FF2B5EF4-FFF2-40B4-BE49-F238E27FC236}">
+                  <a16:creationId xmlns:a16="http://schemas.microsoft.com/office/drawing/2014/main" id="{BC59C866-6111-B925-957E-93772EC7B664}"/>
+                </a:ext>
+              </a:extLst>
+            </p:cNvPr>
+            <p:cNvPicPr>
+              <a:picLocks noChangeAspect="1"/>
+            </p:cNvPicPr>
+            <p:nvPr/>
+          </p:nvPicPr>
+          <p:blipFill>
+            <a:blip r:embed="rId7" cstate="print">
+              <a:extLst>
+                <a:ext uri="{28A0092B-C50C-407E-A947-70E740481C1C}">
+                  <a14:useLocalDpi xmlns:a14="http://schemas.microsoft.com/office/drawing/2010/main" val="0"/>
+                </a:ext>
+              </a:extLst>
+            </a:blip>
+            <a:stretch>
+              <a:fillRect/>
+            </a:stretch>
+          </p:blipFill>
+          <p:spPr>
+            <a:xfrm>
+              <a:off x="5743912" y="5449336"/>
+              <a:ext cx="771791" cy="707080"/>
+            </a:xfrm>
+            <a:prstGeom prst="rect">
+              <a:avLst/>
+            </a:prstGeom>
+          </p:spPr>
+        </p:pic>
+        <p:pic>
+          <p:nvPicPr>
+            <p:cNvPr id="57" name="Picture 33">
+              <a:extLst>
+                <a:ext uri="{FF2B5EF4-FFF2-40B4-BE49-F238E27FC236}">
+                  <a16:creationId xmlns:a16="http://schemas.microsoft.com/office/drawing/2014/main" id="{01B6EAAD-3AEF-5414-25EB-A7D3F218B48E}"/>
+                </a:ext>
+              </a:extLst>
+            </p:cNvPr>
+            <p:cNvPicPr>
+              <a:picLocks noChangeAspect="1"/>
+            </p:cNvPicPr>
+            <p:nvPr/>
+          </p:nvPicPr>
+          <p:blipFill>
+            <a:blip r:embed="rId8" cstate="print">
+              <a:extLst>
+                <a:ext uri="{28A0092B-C50C-407E-A947-70E740481C1C}">
+                  <a14:useLocalDpi xmlns:a14="http://schemas.microsoft.com/office/drawing/2010/main" val="0"/>
+                </a:ext>
+              </a:extLst>
+            </a:blip>
+            <a:stretch>
+              <a:fillRect/>
+            </a:stretch>
+          </p:blipFill>
+          <p:spPr>
+            <a:xfrm>
+              <a:off x="5860442" y="5011873"/>
+              <a:ext cx="468069" cy="428825"/>
+            </a:xfrm>
+            <a:prstGeom prst="rect">
+              <a:avLst/>
+            </a:prstGeom>
+          </p:spPr>
+        </p:pic>
+        <p:sp>
+          <p:nvSpPr>
+            <p:cNvPr id="59" name="Left-Right Arrow 8">
+              <a:extLst>
+                <a:ext uri="{FF2B5EF4-FFF2-40B4-BE49-F238E27FC236}">
+                  <a16:creationId xmlns:a16="http://schemas.microsoft.com/office/drawing/2014/main" id="{96CFED16-F2BF-EF05-C460-E6F3AD0E4182}"/>
+                </a:ext>
+              </a:extLst>
+            </p:cNvPr>
+            <p:cNvSpPr/>
+            <p:nvPr/>
+          </p:nvSpPr>
+          <p:spPr>
+            <a:xfrm>
+              <a:off x="3057241" y="4650880"/>
+              <a:ext cx="1495113" cy="1417113"/>
+            </a:xfrm>
+            <a:prstGeom prst="leftRightArrow">
+              <a:avLst>
+                <a:gd name="adj1" fmla="val 79822"/>
+                <a:gd name="adj2" fmla="val 14767"/>
+              </a:avLst>
+            </a:prstGeom>
+          </p:spPr>
+          <p:style>
+            <a:lnRef idx="2">
+              <a:schemeClr val="accent1">
+                <a:shade val="50000"/>
+              </a:schemeClr>
+            </a:lnRef>
+            <a:fillRef idx="1">
+              <a:schemeClr val="accent1"/>
+            </a:fillRef>
+            <a:effectRef idx="0">
+              <a:schemeClr val="accent1"/>
+            </a:effectRef>
+            <a:fontRef idx="minor">
+              <a:schemeClr val="lt1"/>
+            </a:fontRef>
+          </p:style>
+          <p:txBody>
+            <a:bodyPr rtlCol="0" anchor="ctr"/>
+            <a:lstStyle/>
+            <a:p>
+              <a:pPr algn="ctr" defTabSz="1219170">
+                <a:defRPr/>
+              </a:pPr>
+              <a:r>
+                <a:rPr lang="en-US" sz="1100" b="1" dirty="0">
+                  <a:solidFill>
+                    <a:prstClr val="white"/>
+                  </a:solidFill>
+                  <a:latin typeface="Calibri" panose="020F0502020204030204"/>
+                </a:rPr>
+                <a:t>ACOM</a:t>
+              </a:r>
+              <a:r>
+                <a:rPr lang="en-US" sz="1100" dirty="0">
+                  <a:solidFill>
+                    <a:prstClr val="white"/>
+                  </a:solidFill>
+                  <a:latin typeface="Calibri" panose="020F0502020204030204"/>
+                </a:rPr>
+                <a:t> via </a:t>
+              </a:r>
+              <a:r>
+                <a:rPr lang="it-IT" sz="1100" b="0" i="0" u="none" strike="noStrike" baseline="0" dirty="0">
+                  <a:solidFill>
+                    <a:srgbClr val="FFFFFF"/>
+                  </a:solidFill>
+                  <a:latin typeface="Calibri" panose="020F0502020204030204" pitchFamily="34" charset="0"/>
+                </a:rPr>
+                <a:t>Bluetooth ®</a:t>
+              </a:r>
+              <a:endParaRPr lang="en-US" sz="1100" dirty="0">
+                <a:solidFill>
+                  <a:prstClr val="white"/>
+                </a:solidFill>
+                <a:latin typeface="Calibri" panose="020F0502020204030204"/>
+              </a:endParaRPr>
+            </a:p>
+          </p:txBody>
+        </p:sp>
+        <p:sp>
+          <p:nvSpPr>
+            <p:cNvPr id="63" name="Rounded Rectangle 10">
+              <a:extLst>
+                <a:ext uri="{FF2B5EF4-FFF2-40B4-BE49-F238E27FC236}">
+                  <a16:creationId xmlns:a16="http://schemas.microsoft.com/office/drawing/2014/main" id="{FFDCDD81-7159-B516-A8E0-9719DC9CEF42}"/>
+                </a:ext>
+              </a:extLst>
+            </p:cNvPr>
+            <p:cNvSpPr/>
+            <p:nvPr/>
+          </p:nvSpPr>
+          <p:spPr>
+            <a:xfrm>
+              <a:off x="8080159" y="4287525"/>
+              <a:ext cx="1955360" cy="2143821"/>
+            </a:xfrm>
+            <a:prstGeom prst="roundRect">
+              <a:avLst>
+                <a:gd name="adj" fmla="val 12253"/>
+              </a:avLst>
+            </a:prstGeom>
+            <a:solidFill>
+              <a:schemeClr val="tx1"/>
+            </a:solidFill>
+            <a:ln w="57150"/>
+          </p:spPr>
+          <p:style>
+            <a:lnRef idx="2">
+              <a:schemeClr val="accent1">
+                <a:shade val="50000"/>
+              </a:schemeClr>
+            </a:lnRef>
+            <a:fillRef idx="1">
+              <a:schemeClr val="accent1"/>
+            </a:fillRef>
+            <a:effectRef idx="0">
+              <a:schemeClr val="accent1"/>
+            </a:effectRef>
+            <a:fontRef idx="minor">
+              <a:schemeClr val="lt1"/>
+            </a:fontRef>
+          </p:style>
+          <p:txBody>
+            <a:bodyPr bIns="0" rtlCol="0" anchor="t" anchorCtr="0"/>
+            <a:lstStyle/>
+            <a:p>
+              <a:pPr algn="ctr" defTabSz="1219170">
+                <a:defRPr/>
+              </a:pPr>
+              <a:r>
+                <a:rPr lang="en-US" sz="1200" dirty="0">
+                  <a:solidFill>
+                    <a:schemeClr val="bg1"/>
+                  </a:solidFill>
+                  <a:latin typeface="+mj-lt"/>
+                </a:rPr>
+                <a:t>Server FHIR</a:t>
+              </a:r>
+            </a:p>
+          </p:txBody>
+        </p:sp>
+      </p:grpSp>
+      <p:pic>
+        <p:nvPicPr>
+          <p:cNvPr id="12" name="Segnaposto contenuto 11" descr="Nuvola con riempimento a tinta unita">
+            <a:extLst>
+              <a:ext uri="{FF2B5EF4-FFF2-40B4-BE49-F238E27FC236}">
+                <a16:creationId xmlns:a16="http://schemas.microsoft.com/office/drawing/2014/main" id="{C92DABD1-4272-51EC-EC21-B12A8232F66F}"/>
+              </a:ext>
+            </a:extLst>
+          </p:cNvPr>
+          <p:cNvPicPr>
+            <a:picLocks noGrp="1" noChangeAspect="1"/>
+          </p:cNvPicPr>
+          <p:nvPr>
+            <p:ph sz="quarter" idx="15"/>
+          </p:nvPr>
+        </p:nvPicPr>
+        <p:blipFill>
+          <a:blip r:embed="rId9">
+            <a:extLst>
+              <a:ext uri="{96DAC541-7B7A-43D3-8B79-37D633B846F1}">
+                <asvg:svgBlip xmlns:asvg="http://schemas.microsoft.com/office/drawing/2016/SVG/main" r:embed="rId10"/>
+              </a:ext>
+            </a:extLst>
+          </a:blip>
+          <a:stretch>
+            <a:fillRect/>
+          </a:stretch>
+        </p:blipFill>
+        <p:spPr>
+          <a:xfrm>
+            <a:off x="9026930" y="3592969"/>
+            <a:ext cx="914400" cy="914400"/>
+          </a:xfrm>
+        </p:spPr>
+      </p:pic>
+      <p:sp>
+        <p:nvSpPr>
+          <p:cNvPr id="4" name="Left-Right Arrow 8">
+            <a:extLst>
+              <a:ext uri="{FF2B5EF4-FFF2-40B4-BE49-F238E27FC236}">
+                <a16:creationId xmlns:a16="http://schemas.microsoft.com/office/drawing/2014/main" id="{4C89ABBC-6632-F7A3-5678-0C2E0DB747AC}"/>
+              </a:ext>
+            </a:extLst>
+          </p:cNvPr>
+          <p:cNvSpPr/>
+          <p:nvPr/>
+        </p:nvSpPr>
+        <p:spPr>
+          <a:xfrm>
+            <a:off x="6960856" y="3312034"/>
+            <a:ext cx="1495113" cy="1417113"/>
+          </a:xfrm>
+          <a:prstGeom prst="leftRightArrow">
+            <a:avLst>
+              <a:gd name="adj1" fmla="val 79822"/>
+              <a:gd name="adj2" fmla="val 14767"/>
+            </a:avLst>
+          </a:prstGeom>
+        </p:spPr>
+        <p:style>
+          <a:lnRef idx="2">
+            <a:schemeClr val="accent1">
+              <a:shade val="50000"/>
+            </a:schemeClr>
+          </a:lnRef>
+          <a:fillRef idx="1">
+            <a:schemeClr val="accent1"/>
+          </a:fillRef>
+          <a:effectRef idx="0">
+            <a:schemeClr val="accent1"/>
+          </a:effectRef>
+          <a:fontRef idx="minor">
+            <a:schemeClr val="lt1"/>
+          </a:fontRef>
+        </p:style>
+        <p:txBody>
+          <a:bodyPr rtlCol="0" anchor="ctr"/>
+          <a:lstStyle/>
+          <a:p>
+            <a:pPr algn="ctr" defTabSz="1219170">
+              <a:defRPr/>
+            </a:pPr>
+            <a:r>
+              <a:rPr lang="it-IT" sz="1100" dirty="0">
+                <a:solidFill>
+                  <a:prstClr val="white"/>
+                </a:solidFill>
+                <a:latin typeface="Calibri" panose="020F0502020204030204"/>
+              </a:rPr>
+              <a:t>Upload e download osservazioni </a:t>
+            </a:r>
+            <a:r>
+              <a:rPr lang="it-IT" sz="1100" b="1" dirty="0">
+                <a:solidFill>
+                  <a:prstClr val="white"/>
+                </a:solidFill>
+                <a:latin typeface="Calibri" panose="020F0502020204030204"/>
+              </a:rPr>
+              <a:t>FHIR</a:t>
+            </a:r>
+            <a:endParaRPr lang="en-US" sz="1100" b="1" dirty="0">
+              <a:solidFill>
+                <a:prstClr val="white"/>
+              </a:solidFill>
+              <a:latin typeface="Calibri" panose="020F0502020204030204"/>
+            </a:endParaRPr>
+          </a:p>
+        </p:txBody>
+      </p:sp>
+      <p:pic>
+        <p:nvPicPr>
+          <p:cNvPr id="10" name="Picture 2" descr="FHIR and the Real Challenge of Health Data ...">
+            <a:extLst>
+              <a:ext uri="{FF2B5EF4-FFF2-40B4-BE49-F238E27FC236}">
+                <a16:creationId xmlns:a16="http://schemas.microsoft.com/office/drawing/2014/main" id="{6D789119-6EE1-F86A-5E15-6F524E055F90}"/>
+              </a:ext>
+            </a:extLst>
+          </p:cNvPr>
+          <p:cNvPicPr>
+            <a:picLocks noChangeAspect="1" noChangeArrowheads="1"/>
+          </p:cNvPicPr>
+          <p:nvPr/>
+        </p:nvPicPr>
+        <p:blipFill>
+          <a:blip r:embed="rId11" cstate="print">
+            <a:clrChange>
+              <a:clrFrom>
+                <a:srgbClr val="FFFFFF"/>
+              </a:clrFrom>
+              <a:clrTo>
+                <a:srgbClr val="FFFFFF">
+                  <a:alpha val="0"/>
+                </a:srgbClr>
+              </a:clrTo>
+            </a:clrChange>
+            <a:extLst>
+              <a:ext uri="{28A0092B-C50C-407E-A947-70E740481C1C}">
+                <a14:useLocalDpi xmlns:a14="http://schemas.microsoft.com/office/drawing/2010/main" val="0"/>
+              </a:ext>
+            </a:extLst>
+          </a:blip>
+          <a:srcRect/>
+          <a:stretch>
+            <a:fillRect/>
+          </a:stretch>
+        </p:blipFill>
+        <p:spPr bwMode="auto">
+          <a:xfrm>
+            <a:off x="8607412" y="4286042"/>
+            <a:ext cx="1513179" cy="708778"/>
+          </a:xfrm>
+          <a:prstGeom prst="rect">
+            <a:avLst/>
+          </a:prstGeom>
+          <a:noFill/>
+          <a:extLst>
+            <a:ext uri="{909E8E84-426E-40DD-AFC4-6F175D3DCCD1}">
+              <a14:hiddenFill xmlns:a14="http://schemas.microsoft.com/office/drawing/2010/main">
+                <a:solidFill>
+                  <a:srgbClr val="FFFFFF"/>
+                </a:solidFill>
+              </a14:hiddenFill>
+            </a:ext>
+          </a:extLst>
+        </p:spPr>
+      </p:pic>
+      <p:sp>
+        <p:nvSpPr>
+          <p:cNvPr id="3" name="Curved Left Arrow 10">
+            <a:extLst>
+              <a:ext uri="{FF2B5EF4-FFF2-40B4-BE49-F238E27FC236}">
+                <a16:creationId xmlns:a16="http://schemas.microsoft.com/office/drawing/2014/main" id="{726309FD-46F8-D604-40C4-A3165719CB67}"/>
+              </a:ext>
+            </a:extLst>
+          </p:cNvPr>
+          <p:cNvSpPr/>
+          <p:nvPr/>
+        </p:nvSpPr>
+        <p:spPr>
+          <a:xfrm>
+            <a:off x="10525178" y="3661299"/>
+            <a:ext cx="539552" cy="718582"/>
+          </a:xfrm>
+          <a:prstGeom prst="curvedLeftArrow">
+            <a:avLst/>
+          </a:prstGeom>
+          <a:solidFill>
+            <a:schemeClr val="tx2"/>
+          </a:solidFill>
+          <a:ln w="25400" cap="flat" cmpd="sng" algn="ctr">
+            <a:solidFill>
+              <a:schemeClr val="tx2">
+                <a:lumMod val="60000"/>
+                <a:lumOff val="40000"/>
+              </a:schemeClr>
+            </a:solidFill>
+            <a:prstDash val="solid"/>
+          </a:ln>
+          <a:effectLst/>
+        </p:spPr>
+        <p:style>
+          <a:lnRef idx="2">
+            <a:schemeClr val="accent1">
+              <a:shade val="50000"/>
+            </a:schemeClr>
+          </a:lnRef>
+          <a:fillRef idx="1">
+            <a:schemeClr val="accent1"/>
+          </a:fillRef>
+          <a:effectRef idx="0">
+            <a:schemeClr val="accent1"/>
+          </a:effectRef>
+          <a:fontRef idx="minor">
+            <a:schemeClr val="lt1"/>
+          </a:fontRef>
+        </p:style>
+        <p:txBody>
+          <a:bodyPr rtlCol="0" anchor="ctr"/>
+          <a:lstStyle/>
+          <a:p>
+            <a:pPr algn="ctr"/>
+            <a:endParaRPr lang="en-US">
+              <a:solidFill>
+                <a:schemeClr val="tx1"/>
+              </a:solidFill>
+            </a:endParaRPr>
           </a:p>
         </p:txBody>
       </p:sp>
       <p:sp>
         <p:nvSpPr>
-          <p:cNvPr id="3" name="Segnaposto testo 2">
+          <p:cNvPr id="5" name="Segnaposto numero diapositiva 4">
             <a:extLst>
               <a:ext uri="{FF2B5EF4-FFF2-40B4-BE49-F238E27FC236}">
-                <a16:creationId xmlns:a16="http://schemas.microsoft.com/office/drawing/2014/main" id="{8BE734F0-2DDD-AF70-F13D-F9E4C1929411}"/>
+                <a16:creationId xmlns:a16="http://schemas.microsoft.com/office/drawing/2014/main" id="{26E4ED73-77F5-F09A-5197-34B24F5B76C3}"/>
               </a:ext>
             </a:extLst>
           </p:cNvPr>
@@ -10099,13 +12575,860 @@
             <a:spLocks noGrp="1"/>
           </p:cNvSpPr>
           <p:nvPr>
-            <p:ph type="body" sz="quarter" idx="11"/>
+            <p:ph type="sldNum" sz="quarter" idx="12"/>
+          </p:nvPr>
+        </p:nvSpPr>
+        <p:spPr/>
+        <p:txBody>
+          <a:bodyPr/>
+          <a:lstStyle/>
+          <a:p>
+            <a:pPr rtl="0"/>
+            <a:fld id="{294A09A9-5501-47C1-A89A-A340965A2BE2}" type="slidenum">
+              <a:rPr lang="it-IT" smtClean="0"/>
+              <a:pPr rtl="0"/>
+              <a:t>4</a:t>
+            </a:fld>
+            <a:endParaRPr lang="it-IT" dirty="0">
+              <a:latin typeface="+mn-lt"/>
+            </a:endParaRPr>
+          </a:p>
+        </p:txBody>
+      </p:sp>
+      <p:sp>
+        <p:nvSpPr>
+          <p:cNvPr id="7" name="Elaborazione alternativa 6">
+            <a:extLst>
+              <a:ext uri="{FF2B5EF4-FFF2-40B4-BE49-F238E27FC236}">
+                <a16:creationId xmlns:a16="http://schemas.microsoft.com/office/drawing/2014/main" id="{DA8AB70E-8B2D-6523-16B4-853D8DF8E608}"/>
+              </a:ext>
+            </a:extLst>
+          </p:cNvPr>
+          <p:cNvSpPr/>
+          <p:nvPr/>
+        </p:nvSpPr>
+        <p:spPr>
+          <a:xfrm>
+            <a:off x="1007706" y="2724539"/>
+            <a:ext cx="5953150" cy="2640563"/>
+          </a:xfrm>
+          <a:prstGeom prst="flowChartAlternateProcess">
+            <a:avLst/>
+          </a:prstGeom>
+          <a:noFill/>
+          <a:ln w="38100">
+            <a:solidFill>
+              <a:schemeClr val="tx2"/>
+            </a:solidFill>
+            <a:extLst>
+              <a:ext uri="{C807C97D-BFC1-408E-A445-0C87EB9F89A2}">
+                <ask:lineSketchStyleProps xmlns:ask="http://schemas.microsoft.com/office/drawing/2018/sketchyshapes" sd="1219033472">
+                  <a:custGeom>
+                    <a:avLst/>
+                    <a:gdLst>
+                      <a:gd name="connsiteX0" fmla="*/ 0 w 6046456"/>
+                      <a:gd name="connsiteY0" fmla="*/ 440094 h 2640563"/>
+                      <a:gd name="connsiteX1" fmla="*/ 440094 w 6046456"/>
+                      <a:gd name="connsiteY1" fmla="*/ 0 h 2640563"/>
+                      <a:gd name="connsiteX2" fmla="*/ 1117449 w 6046456"/>
+                      <a:gd name="connsiteY2" fmla="*/ 0 h 2640563"/>
+                      <a:gd name="connsiteX3" fmla="*/ 1639816 w 6046456"/>
+                      <a:gd name="connsiteY3" fmla="*/ 0 h 2640563"/>
+                      <a:gd name="connsiteX4" fmla="*/ 2110521 w 6046456"/>
+                      <a:gd name="connsiteY4" fmla="*/ 0 h 2640563"/>
+                      <a:gd name="connsiteX5" fmla="*/ 2736213 w 6046456"/>
+                      <a:gd name="connsiteY5" fmla="*/ 0 h 2640563"/>
+                      <a:gd name="connsiteX6" fmla="*/ 3258580 w 6046456"/>
+                      <a:gd name="connsiteY6" fmla="*/ 0 h 2640563"/>
+                      <a:gd name="connsiteX7" fmla="*/ 3935935 w 6046456"/>
+                      <a:gd name="connsiteY7" fmla="*/ 0 h 2640563"/>
+                      <a:gd name="connsiteX8" fmla="*/ 4406640 w 6046456"/>
+                      <a:gd name="connsiteY8" fmla="*/ 0 h 2640563"/>
+                      <a:gd name="connsiteX9" fmla="*/ 5083995 w 6046456"/>
+                      <a:gd name="connsiteY9" fmla="*/ 0 h 2640563"/>
+                      <a:gd name="connsiteX10" fmla="*/ 5606362 w 6046456"/>
+                      <a:gd name="connsiteY10" fmla="*/ 0 h 2640563"/>
+                      <a:gd name="connsiteX11" fmla="*/ 6046456 w 6046456"/>
+                      <a:gd name="connsiteY11" fmla="*/ 440094 h 2640563"/>
+                      <a:gd name="connsiteX12" fmla="*/ 6046456 w 6046456"/>
+                      <a:gd name="connsiteY12" fmla="*/ 1044489 h 2640563"/>
+                      <a:gd name="connsiteX13" fmla="*/ 6046456 w 6046456"/>
+                      <a:gd name="connsiteY13" fmla="*/ 1666489 h 2640563"/>
+                      <a:gd name="connsiteX14" fmla="*/ 6046456 w 6046456"/>
+                      <a:gd name="connsiteY14" fmla="*/ 2200469 h 2640563"/>
+                      <a:gd name="connsiteX15" fmla="*/ 5606362 w 6046456"/>
+                      <a:gd name="connsiteY15" fmla="*/ 2640563 h 2640563"/>
+                      <a:gd name="connsiteX16" fmla="*/ 4980670 w 6046456"/>
+                      <a:gd name="connsiteY16" fmla="*/ 2640563 h 2640563"/>
+                      <a:gd name="connsiteX17" fmla="*/ 4406640 w 6046456"/>
+                      <a:gd name="connsiteY17" fmla="*/ 2640563 h 2640563"/>
+                      <a:gd name="connsiteX18" fmla="*/ 3987598 w 6046456"/>
+                      <a:gd name="connsiteY18" fmla="*/ 2640563 h 2640563"/>
+                      <a:gd name="connsiteX19" fmla="*/ 3516894 w 6046456"/>
+                      <a:gd name="connsiteY19" fmla="*/ 2640563 h 2640563"/>
+                      <a:gd name="connsiteX20" fmla="*/ 2839538 w 6046456"/>
+                      <a:gd name="connsiteY20" fmla="*/ 2640563 h 2640563"/>
+                      <a:gd name="connsiteX21" fmla="*/ 2265509 w 6046456"/>
+                      <a:gd name="connsiteY21" fmla="*/ 2640563 h 2640563"/>
+                      <a:gd name="connsiteX22" fmla="*/ 1794804 w 6046456"/>
+                      <a:gd name="connsiteY22" fmla="*/ 2640563 h 2640563"/>
+                      <a:gd name="connsiteX23" fmla="*/ 1220774 w 6046456"/>
+                      <a:gd name="connsiteY23" fmla="*/ 2640563 h 2640563"/>
+                      <a:gd name="connsiteX24" fmla="*/ 440094 w 6046456"/>
+                      <a:gd name="connsiteY24" fmla="*/ 2640563 h 2640563"/>
+                      <a:gd name="connsiteX25" fmla="*/ 0 w 6046456"/>
+                      <a:gd name="connsiteY25" fmla="*/ 2200469 h 2640563"/>
+                      <a:gd name="connsiteX26" fmla="*/ 0 w 6046456"/>
+                      <a:gd name="connsiteY26" fmla="*/ 1578470 h 2640563"/>
+                      <a:gd name="connsiteX27" fmla="*/ 0 w 6046456"/>
+                      <a:gd name="connsiteY27" fmla="*/ 974074 h 2640563"/>
+                      <a:gd name="connsiteX28" fmla="*/ 0 w 6046456"/>
+                      <a:gd name="connsiteY28" fmla="*/ 440094 h 2640563"/>
+                    </a:gdLst>
+                    <a:ahLst/>
+                    <a:cxnLst>
+                      <a:cxn ang="0">
+                        <a:pos x="connsiteX0" y="connsiteY0"/>
+                      </a:cxn>
+                      <a:cxn ang="0">
+                        <a:pos x="connsiteX1" y="connsiteY1"/>
+                      </a:cxn>
+                      <a:cxn ang="0">
+                        <a:pos x="connsiteX2" y="connsiteY2"/>
+                      </a:cxn>
+                      <a:cxn ang="0">
+                        <a:pos x="connsiteX3" y="connsiteY3"/>
+                      </a:cxn>
+                      <a:cxn ang="0">
+                        <a:pos x="connsiteX4" y="connsiteY4"/>
+                      </a:cxn>
+                      <a:cxn ang="0">
+                        <a:pos x="connsiteX5" y="connsiteY5"/>
+                      </a:cxn>
+                      <a:cxn ang="0">
+                        <a:pos x="connsiteX6" y="connsiteY6"/>
+                      </a:cxn>
+                      <a:cxn ang="0">
+                        <a:pos x="connsiteX7" y="connsiteY7"/>
+                      </a:cxn>
+                      <a:cxn ang="0">
+                        <a:pos x="connsiteX8" y="connsiteY8"/>
+                      </a:cxn>
+                      <a:cxn ang="0">
+                        <a:pos x="connsiteX9" y="connsiteY9"/>
+                      </a:cxn>
+                      <a:cxn ang="0">
+                        <a:pos x="connsiteX10" y="connsiteY10"/>
+                      </a:cxn>
+                      <a:cxn ang="0">
+                        <a:pos x="connsiteX11" y="connsiteY11"/>
+                      </a:cxn>
+                      <a:cxn ang="0">
+                        <a:pos x="connsiteX12" y="connsiteY12"/>
+                      </a:cxn>
+                      <a:cxn ang="0">
+                        <a:pos x="connsiteX13" y="connsiteY13"/>
+                      </a:cxn>
+                      <a:cxn ang="0">
+                        <a:pos x="connsiteX14" y="connsiteY14"/>
+                      </a:cxn>
+                      <a:cxn ang="0">
+                        <a:pos x="connsiteX15" y="connsiteY15"/>
+                      </a:cxn>
+                      <a:cxn ang="0">
+                        <a:pos x="connsiteX16" y="connsiteY16"/>
+                      </a:cxn>
+                      <a:cxn ang="0">
+                        <a:pos x="connsiteX17" y="connsiteY17"/>
+                      </a:cxn>
+                      <a:cxn ang="0">
+                        <a:pos x="connsiteX18" y="connsiteY18"/>
+                      </a:cxn>
+                      <a:cxn ang="0">
+                        <a:pos x="connsiteX19" y="connsiteY19"/>
+                      </a:cxn>
+                      <a:cxn ang="0">
+                        <a:pos x="connsiteX20" y="connsiteY20"/>
+                      </a:cxn>
+                      <a:cxn ang="0">
+                        <a:pos x="connsiteX21" y="connsiteY21"/>
+                      </a:cxn>
+                      <a:cxn ang="0">
+                        <a:pos x="connsiteX22" y="connsiteY22"/>
+                      </a:cxn>
+                      <a:cxn ang="0">
+                        <a:pos x="connsiteX23" y="connsiteY23"/>
+                      </a:cxn>
+                      <a:cxn ang="0">
+                        <a:pos x="connsiteX24" y="connsiteY24"/>
+                      </a:cxn>
+                      <a:cxn ang="0">
+                        <a:pos x="connsiteX25" y="connsiteY25"/>
+                      </a:cxn>
+                      <a:cxn ang="0">
+                        <a:pos x="connsiteX26" y="connsiteY26"/>
+                      </a:cxn>
+                      <a:cxn ang="0">
+                        <a:pos x="connsiteX27" y="connsiteY27"/>
+                      </a:cxn>
+                      <a:cxn ang="0">
+                        <a:pos x="connsiteX28" y="connsiteY28"/>
+                      </a:cxn>
+                    </a:cxnLst>
+                    <a:rect l="l" t="t" r="r" b="b"/>
+                    <a:pathLst>
+                      <a:path w="6046456" h="2640563" extrusionOk="0">
+                        <a:moveTo>
+                          <a:pt x="0" y="440094"/>
+                        </a:moveTo>
+                        <a:cubicBezTo>
+                          <a:pt x="-42569" y="170779"/>
+                          <a:pt x="142703" y="20393"/>
+                          <a:pt x="440094" y="0"/>
+                        </a:cubicBezTo>
+                        <a:cubicBezTo>
+                          <a:pt x="680745" y="-45245"/>
+                          <a:pt x="976571" y="33845"/>
+                          <a:pt x="1117449" y="0"/>
+                        </a:cubicBezTo>
+                        <a:cubicBezTo>
+                          <a:pt x="1258328" y="-33845"/>
+                          <a:pt x="1506494" y="52524"/>
+                          <a:pt x="1639816" y="0"/>
+                        </a:cubicBezTo>
+                        <a:cubicBezTo>
+                          <a:pt x="1773138" y="-52524"/>
+                          <a:pt x="1974044" y="21277"/>
+                          <a:pt x="2110521" y="0"/>
+                        </a:cubicBezTo>
+                        <a:cubicBezTo>
+                          <a:pt x="2246998" y="-21277"/>
+                          <a:pt x="2570345" y="32668"/>
+                          <a:pt x="2736213" y="0"/>
+                        </a:cubicBezTo>
+                        <a:cubicBezTo>
+                          <a:pt x="2902081" y="-32668"/>
+                          <a:pt x="3032528" y="41392"/>
+                          <a:pt x="3258580" y="0"/>
+                        </a:cubicBezTo>
+                        <a:cubicBezTo>
+                          <a:pt x="3484632" y="-41392"/>
+                          <a:pt x="3746587" y="12995"/>
+                          <a:pt x="3935935" y="0"/>
+                        </a:cubicBezTo>
+                        <a:cubicBezTo>
+                          <a:pt x="4125283" y="-12995"/>
+                          <a:pt x="4310631" y="18247"/>
+                          <a:pt x="4406640" y="0"/>
+                        </a:cubicBezTo>
+                        <a:cubicBezTo>
+                          <a:pt x="4502649" y="-18247"/>
+                          <a:pt x="4869948" y="29128"/>
+                          <a:pt x="5083995" y="0"/>
+                        </a:cubicBezTo>
+                        <a:cubicBezTo>
+                          <a:pt x="5298042" y="-29128"/>
+                          <a:pt x="5385694" y="8273"/>
+                          <a:pt x="5606362" y="0"/>
+                        </a:cubicBezTo>
+                        <a:cubicBezTo>
+                          <a:pt x="5789906" y="-3404"/>
+                          <a:pt x="6069184" y="134712"/>
+                          <a:pt x="6046456" y="440094"/>
+                        </a:cubicBezTo>
+                        <a:cubicBezTo>
+                          <a:pt x="6104832" y="690667"/>
+                          <a:pt x="5992733" y="829596"/>
+                          <a:pt x="6046456" y="1044489"/>
+                        </a:cubicBezTo>
+                        <a:cubicBezTo>
+                          <a:pt x="6100179" y="1259383"/>
+                          <a:pt x="6022052" y="1374981"/>
+                          <a:pt x="6046456" y="1666489"/>
+                        </a:cubicBezTo>
+                        <a:cubicBezTo>
+                          <a:pt x="6070860" y="1957997"/>
+                          <a:pt x="6036460" y="2049368"/>
+                          <a:pt x="6046456" y="2200469"/>
+                        </a:cubicBezTo>
+                        <a:cubicBezTo>
+                          <a:pt x="5975364" y="2455200"/>
+                          <a:pt x="5794988" y="2603007"/>
+                          <a:pt x="5606362" y="2640563"/>
+                        </a:cubicBezTo>
+                        <a:cubicBezTo>
+                          <a:pt x="5379871" y="2645638"/>
+                          <a:pt x="5210292" y="2636065"/>
+                          <a:pt x="4980670" y="2640563"/>
+                        </a:cubicBezTo>
+                        <a:cubicBezTo>
+                          <a:pt x="4751048" y="2645061"/>
+                          <a:pt x="4689693" y="2592286"/>
+                          <a:pt x="4406640" y="2640563"/>
+                        </a:cubicBezTo>
+                        <a:cubicBezTo>
+                          <a:pt x="4123587" y="2688840"/>
+                          <a:pt x="4084801" y="2602302"/>
+                          <a:pt x="3987598" y="2640563"/>
+                        </a:cubicBezTo>
+                        <a:cubicBezTo>
+                          <a:pt x="3890395" y="2678824"/>
+                          <a:pt x="3678033" y="2589654"/>
+                          <a:pt x="3516894" y="2640563"/>
+                        </a:cubicBezTo>
+                        <a:cubicBezTo>
+                          <a:pt x="3355755" y="2691472"/>
+                          <a:pt x="3022620" y="2579831"/>
+                          <a:pt x="2839538" y="2640563"/>
+                        </a:cubicBezTo>
+                        <a:cubicBezTo>
+                          <a:pt x="2656456" y="2701295"/>
+                          <a:pt x="2384311" y="2603079"/>
+                          <a:pt x="2265509" y="2640563"/>
+                        </a:cubicBezTo>
+                        <a:cubicBezTo>
+                          <a:pt x="2146707" y="2678047"/>
+                          <a:pt x="1940205" y="2615226"/>
+                          <a:pt x="1794804" y="2640563"/>
+                        </a:cubicBezTo>
+                        <a:cubicBezTo>
+                          <a:pt x="1649403" y="2665900"/>
+                          <a:pt x="1390725" y="2592526"/>
+                          <a:pt x="1220774" y="2640563"/>
+                        </a:cubicBezTo>
+                        <a:cubicBezTo>
+                          <a:pt x="1050823" y="2688600"/>
+                          <a:pt x="735332" y="2561157"/>
+                          <a:pt x="440094" y="2640563"/>
+                        </a:cubicBezTo>
+                        <a:cubicBezTo>
+                          <a:pt x="209451" y="2602383"/>
+                          <a:pt x="24123" y="2469609"/>
+                          <a:pt x="0" y="2200469"/>
+                        </a:cubicBezTo>
+                        <a:cubicBezTo>
+                          <a:pt x="-23780" y="1993048"/>
+                          <a:pt x="49531" y="1706490"/>
+                          <a:pt x="0" y="1578470"/>
+                        </a:cubicBezTo>
+                        <a:cubicBezTo>
+                          <a:pt x="-49531" y="1450450"/>
+                          <a:pt x="42074" y="1122045"/>
+                          <a:pt x="0" y="974074"/>
+                        </a:cubicBezTo>
+                        <a:cubicBezTo>
+                          <a:pt x="-42074" y="826103"/>
+                          <a:pt x="56192" y="570668"/>
+                          <a:pt x="0" y="440094"/>
+                        </a:cubicBezTo>
+                        <a:close/>
+                      </a:path>
+                    </a:pathLst>
+                  </a:custGeom>
+                  <ask:type>
+                    <ask:lineSketchNone/>
+                  </ask:type>
+                </ask:lineSketchStyleProps>
+              </a:ext>
+            </a:extLst>
+          </a:ln>
+        </p:spPr>
+        <p:style>
+          <a:lnRef idx="2">
+            <a:schemeClr val="accent1">
+              <a:shade val="15000"/>
+            </a:schemeClr>
+          </a:lnRef>
+          <a:fillRef idx="1">
+            <a:schemeClr val="accent1"/>
+          </a:fillRef>
+          <a:effectRef idx="0">
+            <a:schemeClr val="accent1"/>
+          </a:effectRef>
+          <a:fontRef idx="minor">
+            <a:schemeClr val="lt1"/>
+          </a:fontRef>
+        </p:style>
+        <p:txBody>
+          <a:bodyPr rtlCol="0" anchor="ctr"/>
+          <a:lstStyle/>
+          <a:p>
+            <a:pPr algn="ctr"/>
+            <a:endParaRPr lang="it-IT"/>
+          </a:p>
+        </p:txBody>
+      </p:sp>
+    </p:spTree>
+    <p:extLst>
+      <p:ext uri="{BB962C8B-B14F-4D97-AF65-F5344CB8AC3E}">
+        <p14:creationId xmlns:p14="http://schemas.microsoft.com/office/powerpoint/2010/main" val="511606997"/>
+      </p:ext>
+    </p:extLst>
+  </p:cSld>
+  <p:clrMapOvr>
+    <a:masterClrMapping/>
+  </p:clrMapOvr>
+  <p:timing>
+    <p:tnLst>
+      <p:par>
+        <p:cTn id="1" dur="indefinite" restart="never" nodeType="tmRoot">
+          <p:childTnLst>
+            <p:seq concurrent="1" nextAc="seek">
+              <p:cTn id="2" dur="indefinite" nodeType="mainSeq">
+                <p:childTnLst>
+                  <p:par>
+                    <p:cTn id="3" fill="hold">
+                      <p:stCondLst>
+                        <p:cond delay="indefinite"/>
+                      </p:stCondLst>
+                      <p:childTnLst>
+                        <p:par>
+                          <p:cTn id="4" fill="hold">
+                            <p:stCondLst>
+                              <p:cond delay="0"/>
+                            </p:stCondLst>
+                            <p:childTnLst>
+                              <p:par>
+                                <p:cTn id="5" presetID="10" presetClass="entr" presetSubtype="0" fill="hold" grpId="0" nodeType="clickEffect">
+                                  <p:stCondLst>
+                                    <p:cond delay="0"/>
+                                  </p:stCondLst>
+                                  <p:childTnLst>
+                                    <p:set>
+                                      <p:cBhvr>
+                                        <p:cTn id="6" dur="1" fill="hold">
+                                          <p:stCondLst>
+                                            <p:cond delay="0"/>
+                                          </p:stCondLst>
+                                        </p:cTn>
+                                        <p:tgtEl>
+                                          <p:spTgt spid="7"/>
+                                        </p:tgtEl>
+                                        <p:attrNameLst>
+                                          <p:attrName>style.visibility</p:attrName>
+                                        </p:attrNameLst>
+                                      </p:cBhvr>
+                                      <p:to>
+                                        <p:strVal val="visible"/>
+                                      </p:to>
+                                    </p:set>
+                                    <p:animEffect transition="in" filter="fade">
+                                      <p:cBhvr>
+                                        <p:cTn id="7" dur="500"/>
+                                        <p:tgtEl>
+                                          <p:spTgt spid="7"/>
+                                        </p:tgtEl>
+                                      </p:cBhvr>
+                                    </p:animEffect>
+                                  </p:childTnLst>
+                                </p:cTn>
+                              </p:par>
+                            </p:childTnLst>
+                          </p:cTn>
+                        </p:par>
+                      </p:childTnLst>
+                    </p:cTn>
+                  </p:par>
+                </p:childTnLst>
+              </p:cTn>
+              <p:prevCondLst>
+                <p:cond evt="onPrev" delay="0">
+                  <p:tgtEl>
+                    <p:sldTgt/>
+                  </p:tgtEl>
+                </p:cond>
+              </p:prevCondLst>
+              <p:nextCondLst>
+                <p:cond evt="onNext" delay="0">
+                  <p:tgtEl>
+                    <p:sldTgt/>
+                  </p:tgtEl>
+                </p:cond>
+              </p:nextCondLst>
+            </p:seq>
+          </p:childTnLst>
+        </p:cTn>
+      </p:par>
+    </p:tnLst>
+    <p:bldLst>
+      <p:bldP spid="7" grpId="0" animBg="1"/>
+    </p:bldLst>
+  </p:timing>
+</p:sld>
+</file>
+
+<file path=ppt/slides/slide5.xml><?xml version="1.0" encoding="utf-8"?>
+<p:sld xmlns:a="http://schemas.openxmlformats.org/drawingml/2006/main" xmlns:r="http://schemas.openxmlformats.org/officeDocument/2006/relationships" xmlns:p="http://schemas.openxmlformats.org/presentationml/2006/main">
+  <p:cSld>
+    <p:spTree>
+      <p:nvGrpSpPr>
+        <p:cNvPr id="1" name=""/>
+        <p:cNvGrpSpPr/>
+        <p:nvPr/>
+      </p:nvGrpSpPr>
+      <p:grpSpPr>
+        <a:xfrm>
+          <a:off x="0" y="0"/>
+          <a:ext cx="0" cy="0"/>
+          <a:chOff x="0" y="0"/>
+          <a:chExt cx="0" cy="0"/>
+        </a:xfrm>
+      </p:grpSpPr>
+      <p:sp>
+        <p:nvSpPr>
+          <p:cNvPr id="2" name="Titolo 1">
+            <a:extLst>
+              <a:ext uri="{FF2B5EF4-FFF2-40B4-BE49-F238E27FC236}">
+                <a16:creationId xmlns:a16="http://schemas.microsoft.com/office/drawing/2014/main" id="{979312F5-A241-3BFE-E84B-B36E1CE8FD1F}"/>
+              </a:ext>
+            </a:extLst>
+          </p:cNvPr>
+          <p:cNvSpPr>
+            <a:spLocks noGrp="1"/>
+          </p:cNvSpPr>
+          <p:nvPr>
+            <p:ph type="title"/>
           </p:nvPr>
         </p:nvSpPr>
         <p:spPr>
           <a:xfrm>
-            <a:off x="594360" y="4549552"/>
-            <a:ext cx="5486400" cy="1645920"/>
+            <a:off x="594360" y="278129"/>
+            <a:ext cx="9778365" cy="1494596"/>
+          </a:xfrm>
+        </p:spPr>
+        <p:txBody>
+          <a:bodyPr/>
+          <a:lstStyle/>
+          <a:p>
+            <a:r>
+              <a:rPr lang="it-IT" dirty="0"/>
+              <a:t>Obbiettivo tesi</a:t>
+            </a:r>
+          </a:p>
+        </p:txBody>
+      </p:sp>
+      <p:sp>
+        <p:nvSpPr>
+          <p:cNvPr id="8" name="Segnaposto contenuto 7">
+            <a:extLst>
+              <a:ext uri="{FF2B5EF4-FFF2-40B4-BE49-F238E27FC236}">
+                <a16:creationId xmlns:a16="http://schemas.microsoft.com/office/drawing/2014/main" id="{E78FEFCE-05EE-692F-66B8-B5ED151C0192}"/>
+              </a:ext>
+            </a:extLst>
+          </p:cNvPr>
+          <p:cNvSpPr>
+            <a:spLocks noGrp="1"/>
+          </p:cNvSpPr>
+          <p:nvPr>
+            <p:ph sz="quarter" idx="15"/>
+          </p:nvPr>
+        </p:nvSpPr>
+        <p:spPr>
+          <a:xfrm>
+            <a:off x="594360" y="2676525"/>
+            <a:ext cx="9778365" cy="3597470"/>
+          </a:xfrm>
+        </p:spPr>
+        <p:txBody>
+          <a:bodyPr/>
+          <a:lstStyle/>
+          <a:p>
+            <a:pPr marL="457200" indent="-457200">
+              <a:buFont typeface="+mj-lt"/>
+              <a:buAutoNum type="arabicPeriod"/>
+            </a:pPr>
+            <a:r>
+              <a:rPr lang="it-IT" sz="1600" dirty="0"/>
+              <a:t>Studio IEEE 1103-10206</a:t>
+            </a:r>
+          </a:p>
+          <a:p>
+            <a:pPr marL="457200" indent="-457200">
+              <a:buFont typeface="+mj-lt"/>
+              <a:buAutoNum type="arabicPeriod"/>
+            </a:pPr>
+            <a:r>
+              <a:rPr lang="it-IT" sz="1600" dirty="0"/>
+              <a:t>Studio FHIR</a:t>
+            </a:r>
+          </a:p>
+          <a:p>
+            <a:pPr marL="457200" indent="-457200">
+              <a:buFont typeface="+mj-lt"/>
+              <a:buAutoNum type="arabicPeriod"/>
+            </a:pPr>
+            <a:r>
+              <a:rPr lang="it-IT" sz="1600" dirty="0"/>
+              <a:t>Sviluppo convertitore </a:t>
+            </a:r>
+          </a:p>
+        </p:txBody>
+      </p:sp>
+      <p:sp>
+        <p:nvSpPr>
+          <p:cNvPr id="5" name="Segnaposto numero diapositiva 4">
+            <a:extLst>
+              <a:ext uri="{FF2B5EF4-FFF2-40B4-BE49-F238E27FC236}">
+                <a16:creationId xmlns:a16="http://schemas.microsoft.com/office/drawing/2014/main" id="{C639AE6C-4A86-993D-11B4-5994747B919B}"/>
+              </a:ext>
+            </a:extLst>
+          </p:cNvPr>
+          <p:cNvSpPr>
+            <a:spLocks noGrp="1"/>
+          </p:cNvSpPr>
+          <p:nvPr>
+            <p:ph type="sldNum" sz="quarter" idx="12"/>
+          </p:nvPr>
+        </p:nvSpPr>
+        <p:spPr>
+          <a:xfrm>
+            <a:off x="594360" y="6332220"/>
+            <a:ext cx="523240" cy="247651"/>
+          </a:xfrm>
+        </p:spPr>
+        <p:txBody>
+          <a:bodyPr/>
+          <a:lstStyle/>
+          <a:p>
+            <a:fld id="{294A09A9-5501-47C1-A89A-A340965A2BE2}" type="slidenum">
+              <a:rPr lang="it-IT" smtClean="0"/>
+              <a:pPr/>
+              <a:t>5</a:t>
+            </a:fld>
+            <a:endParaRPr lang="it-IT" dirty="0"/>
+          </a:p>
+        </p:txBody>
+      </p:sp>
+    </p:spTree>
+    <p:extLst>
+      <p:ext uri="{BB962C8B-B14F-4D97-AF65-F5344CB8AC3E}">
+        <p14:creationId xmlns:p14="http://schemas.microsoft.com/office/powerpoint/2010/main" val="343753163"/>
+      </p:ext>
+    </p:extLst>
+  </p:cSld>
+  <p:clrMapOvr>
+    <a:masterClrMapping/>
+  </p:clrMapOvr>
+</p:sld>
+</file>
+
+<file path=ppt/slides/slide6.xml><?xml version="1.0" encoding="utf-8"?>
+<p:sld xmlns:a="http://schemas.openxmlformats.org/drawingml/2006/main" xmlns:r="http://schemas.openxmlformats.org/officeDocument/2006/relationships" xmlns:p="http://schemas.openxmlformats.org/presentationml/2006/main">
+  <p:cSld>
+    <p:spTree>
+      <p:nvGrpSpPr>
+        <p:cNvPr id="1" name=""/>
+        <p:cNvGrpSpPr/>
+        <p:nvPr/>
+      </p:nvGrpSpPr>
+      <p:grpSpPr>
+        <a:xfrm>
+          <a:off x="0" y="0"/>
+          <a:ext cx="0" cy="0"/>
+          <a:chOff x="0" y="0"/>
+          <a:chExt cx="0" cy="0"/>
+        </a:xfrm>
+      </p:grpSpPr>
+      <p:sp>
+        <p:nvSpPr>
+          <p:cNvPr id="2" name="Titolo 1">
+            <a:extLst>
+              <a:ext uri="{FF2B5EF4-FFF2-40B4-BE49-F238E27FC236}">
+                <a16:creationId xmlns:a16="http://schemas.microsoft.com/office/drawing/2014/main" id="{DDE826F3-B1A9-C6D4-80A2-7CCADFEA9915}"/>
+              </a:ext>
+            </a:extLst>
+          </p:cNvPr>
+          <p:cNvSpPr>
+            <a:spLocks noGrp="1"/>
+          </p:cNvSpPr>
+          <p:nvPr>
+            <p:ph type="title"/>
+          </p:nvPr>
+        </p:nvSpPr>
+        <p:spPr/>
+        <p:txBody>
+          <a:bodyPr/>
+          <a:lstStyle/>
+          <a:p>
+            <a:r>
+              <a:rPr lang="it-IT" dirty="0"/>
+              <a:t>Osservazioni ACOM</a:t>
+            </a:r>
+          </a:p>
+        </p:txBody>
+      </p:sp>
+      <p:sp>
+        <p:nvSpPr>
+          <p:cNvPr id="3" name="Segnaposto contenuto 2">
+            <a:extLst>
+              <a:ext uri="{FF2B5EF4-FFF2-40B4-BE49-F238E27FC236}">
+                <a16:creationId xmlns:a16="http://schemas.microsoft.com/office/drawing/2014/main" id="{6C2B0DB9-7139-1DD7-2E95-C7135E14C45F}"/>
+              </a:ext>
+            </a:extLst>
+          </p:cNvPr>
+          <p:cNvSpPr>
+            <a:spLocks noGrp="1"/>
+          </p:cNvSpPr>
+          <p:nvPr>
+            <p:ph sz="quarter" idx="15"/>
+          </p:nvPr>
+        </p:nvSpPr>
+        <p:spPr>
+          <a:xfrm>
+            <a:off x="594360" y="2676525"/>
+            <a:ext cx="3002855" cy="3597470"/>
+          </a:xfrm>
+        </p:spPr>
+        <p:txBody>
+          <a:bodyPr>
+            <a:normAutofit/>
+          </a:bodyPr>
+          <a:lstStyle/>
+          <a:p>
+            <a:pPr marL="285750" indent="-285750">
+              <a:buFont typeface="Arial" panose="020B0604020202020204" pitchFamily="34" charset="0"/>
+              <a:buChar char="•"/>
+            </a:pPr>
+            <a:r>
+              <a:rPr lang="it-IT" sz="1600" dirty="0"/>
+              <a:t>ACOM definisce un insieme di classi che modellano i diversi tipi di </a:t>
+            </a:r>
+            <a:r>
+              <a:rPr lang="it-IT" sz="1600" b="1" dirty="0"/>
+              <a:t>osservazioni</a:t>
+            </a:r>
+            <a:r>
+              <a:rPr lang="it-IT" sz="1600" dirty="0"/>
+              <a:t> che i dispositivi di salute personale possono creare.</a:t>
+            </a:r>
+          </a:p>
+          <a:p>
+            <a:pPr marL="285750" indent="-285750">
+              <a:buFont typeface="Arial" panose="020B0604020202020204" pitchFamily="34" charset="0"/>
+              <a:buChar char="•"/>
+            </a:pPr>
+            <a:r>
+              <a:rPr lang="it-IT" sz="1600" dirty="0"/>
+              <a:t>Questa base permette lo sviluppo di specializzazioni</a:t>
+            </a:r>
+          </a:p>
+        </p:txBody>
+      </p:sp>
+      <p:pic>
+        <p:nvPicPr>
+          <p:cNvPr id="5" name="Picture 3">
+            <a:extLst>
+              <a:ext uri="{FF2B5EF4-FFF2-40B4-BE49-F238E27FC236}">
+                <a16:creationId xmlns:a16="http://schemas.microsoft.com/office/drawing/2014/main" id="{A23B0152-79D8-1C18-2C94-378197C74368}"/>
+              </a:ext>
+            </a:extLst>
+          </p:cNvPr>
+          <p:cNvPicPr>
+            <a:picLocks noGrp="1" noChangeAspect="1"/>
+          </p:cNvPicPr>
+          <p:nvPr>
+            <p:ph sz="quarter" idx="16"/>
+          </p:nvPr>
+        </p:nvPicPr>
+        <p:blipFill>
+          <a:blip r:embed="rId2"/>
+          <a:stretch>
+            <a:fillRect/>
+          </a:stretch>
+        </p:blipFill>
+        <p:spPr>
+          <a:xfrm>
+            <a:off x="3842966" y="2097241"/>
+            <a:ext cx="6980253" cy="4482630"/>
+          </a:xfrm>
+          <a:prstGeom prst="rect">
+            <a:avLst/>
+          </a:prstGeom>
+        </p:spPr>
+      </p:pic>
+      <p:sp>
+        <p:nvSpPr>
+          <p:cNvPr id="4" name="Segnaposto numero diapositiva 3">
+            <a:extLst>
+              <a:ext uri="{FF2B5EF4-FFF2-40B4-BE49-F238E27FC236}">
+                <a16:creationId xmlns:a16="http://schemas.microsoft.com/office/drawing/2014/main" id="{94D13361-0EF9-915F-7A6E-78D0881CF188}"/>
+              </a:ext>
+            </a:extLst>
+          </p:cNvPr>
+          <p:cNvSpPr>
+            <a:spLocks noGrp="1"/>
+          </p:cNvSpPr>
+          <p:nvPr>
+            <p:ph type="sldNum" sz="quarter" idx="12"/>
+          </p:nvPr>
+        </p:nvSpPr>
+        <p:spPr/>
+        <p:txBody>
+          <a:bodyPr/>
+          <a:lstStyle/>
+          <a:p>
+            <a:pPr rtl="0"/>
+            <a:fld id="{294A09A9-5501-47C1-A89A-A340965A2BE2}" type="slidenum">
+              <a:rPr lang="it-IT" smtClean="0"/>
+              <a:pPr rtl="0"/>
+              <a:t>6</a:t>
+            </a:fld>
+            <a:endParaRPr lang="it-IT" dirty="0">
+              <a:latin typeface="+mn-lt"/>
+            </a:endParaRPr>
+          </a:p>
+        </p:txBody>
+      </p:sp>
+    </p:spTree>
+    <p:extLst>
+      <p:ext uri="{BB962C8B-B14F-4D97-AF65-F5344CB8AC3E}">
+        <p14:creationId xmlns:p14="http://schemas.microsoft.com/office/powerpoint/2010/main" val="555919634"/>
+      </p:ext>
+    </p:extLst>
+  </p:cSld>
+  <p:clrMapOvr>
+    <a:masterClrMapping/>
+  </p:clrMapOvr>
+</p:sld>
+</file>
+
+<file path=ppt/slides/slide7.xml><?xml version="1.0" encoding="utf-8"?>
+<p:sld xmlns:a="http://schemas.openxmlformats.org/drawingml/2006/main" xmlns:r="http://schemas.openxmlformats.org/officeDocument/2006/relationships" xmlns:p="http://schemas.openxmlformats.org/presentationml/2006/main">
+  <p:cSld>
+    <p:spTree>
+      <p:nvGrpSpPr>
+        <p:cNvPr id="1" name=""/>
+        <p:cNvGrpSpPr/>
+        <p:nvPr/>
+      </p:nvGrpSpPr>
+      <p:grpSpPr>
+        <a:xfrm>
+          <a:off x="0" y="0"/>
+          <a:ext cx="0" cy="0"/>
+          <a:chOff x="0" y="0"/>
+          <a:chExt cx="0" cy="0"/>
+        </a:xfrm>
+      </p:grpSpPr>
+      <p:sp>
+        <p:nvSpPr>
+          <p:cNvPr id="2" name="Titolo 1">
+            <a:extLst>
+              <a:ext uri="{FF2B5EF4-FFF2-40B4-BE49-F238E27FC236}">
+                <a16:creationId xmlns:a16="http://schemas.microsoft.com/office/drawing/2014/main" id="{805346ED-721D-85EE-2F1B-A31D0912DE29}"/>
+              </a:ext>
+            </a:extLst>
+          </p:cNvPr>
+          <p:cNvSpPr>
+            <a:spLocks noGrp="1"/>
+          </p:cNvSpPr>
+          <p:nvPr>
+            <p:ph type="title"/>
+          </p:nvPr>
+        </p:nvSpPr>
+        <p:spPr>
+          <a:xfrm>
+            <a:off x="594360" y="278129"/>
+            <a:ext cx="9778365" cy="1494596"/>
           </a:xfrm>
         </p:spPr>
         <p:txBody>
@@ -10118,37 +13441,888 @@
           <a:p>
             <a:pPr rtl="0"/>
             <a:r>
-              <a:rPr lang="it-IT"/>
-              <a:t>Brita Tamm</a:t>
+              <a:rPr lang="it-IT" dirty="0"/>
+              <a:t>Mappatura da ACOM a FHIR</a:t>
             </a:r>
           </a:p>
+        </p:txBody>
+      </p:sp>
+      <p:sp>
+        <p:nvSpPr>
+          <p:cNvPr id="3" name="Segnaposto contenuto 2">
+            <a:extLst>
+              <a:ext uri="{FF2B5EF4-FFF2-40B4-BE49-F238E27FC236}">
+                <a16:creationId xmlns:a16="http://schemas.microsoft.com/office/drawing/2014/main" id="{DB097449-5B72-ADA0-3B2D-1CBC160D6B90}"/>
+              </a:ext>
+            </a:extLst>
+          </p:cNvPr>
+          <p:cNvSpPr>
+            <a:spLocks noGrp="1"/>
+          </p:cNvSpPr>
+          <p:nvPr>
+            <p:ph sz="quarter" idx="15"/>
+          </p:nvPr>
+        </p:nvSpPr>
+        <p:spPr>
+          <a:xfrm>
+            <a:off x="594361" y="2676525"/>
+            <a:ext cx="3035247" cy="3597470"/>
+          </a:xfrm>
+        </p:spPr>
+        <p:txBody>
+          <a:bodyPr rtlCol="0">
+            <a:normAutofit/>
+          </a:bodyPr>
+          <a:lstStyle>
+            <a:defPPr>
+              <a:defRPr lang="it-IT"/>
+            </a:defPPr>
+          </a:lstStyle>
           <a:p>
             <a:pPr rtl="0"/>
             <a:r>
-              <a:rPr lang="it-IT"/>
-              <a:t>502-555-0152</a:t>
+              <a:rPr lang="it-IT" sz="1600" dirty="0">
+                <a:sym typeface="Wingdings" panose="05000000000000000000" pitchFamily="2" charset="2"/>
+              </a:rPr>
+              <a:t>Nel progetto di tesi è stato sviluppato un convertitore in grado di convertire le specifiche IEEE 11073-10408 </a:t>
             </a:r>
-          </a:p>
+            <a:r>
+              <a:rPr lang="it-IT" sz="1600" b="1" dirty="0">
+                <a:sym typeface="Wingdings" panose="05000000000000000000" pitchFamily="2" charset="2"/>
+              </a:rPr>
+              <a:t>Termometro</a:t>
+            </a:r>
+            <a:r>
+              <a:rPr lang="it-IT" sz="1600" dirty="0">
+                <a:sym typeface="Wingdings" panose="05000000000000000000" pitchFamily="2" charset="2"/>
+              </a:rPr>
+              <a:t> e IEEE 11073-10415 </a:t>
+            </a:r>
+            <a:r>
+              <a:rPr lang="it-IT" sz="1600" b="1" dirty="0">
+                <a:sym typeface="Wingdings" panose="05000000000000000000" pitchFamily="2" charset="2"/>
+              </a:rPr>
+              <a:t>Bilancia</a:t>
+            </a:r>
+          </a:p>
+        </p:txBody>
+      </p:sp>
+      <p:graphicFrame>
+        <p:nvGraphicFramePr>
+          <p:cNvPr id="5" name="Table 4">
+            <a:extLst>
+              <a:ext uri="{FF2B5EF4-FFF2-40B4-BE49-F238E27FC236}">
+                <a16:creationId xmlns:a16="http://schemas.microsoft.com/office/drawing/2014/main" id="{53ADB8C0-B7A5-CE30-62C8-79A827F7A094}"/>
+              </a:ext>
+            </a:extLst>
+          </p:cNvPr>
+          <p:cNvGraphicFramePr>
+            <a:graphicFrameLocks noGrp="1"/>
+          </p:cNvGraphicFramePr>
+          <p:nvPr>
+            <p:extLst>
+              <p:ext uri="{D42A27DB-BD31-4B8C-83A1-F6EECF244321}">
+                <p14:modId xmlns:p14="http://schemas.microsoft.com/office/powerpoint/2010/main" val="1836332384"/>
+              </p:ext>
+            </p:extLst>
+          </p:nvPr>
+        </p:nvGraphicFramePr>
+        <p:xfrm>
+          <a:off x="3890867" y="2217510"/>
+          <a:ext cx="6937748" cy="4362361"/>
+        </p:xfrm>
+        <a:graphic>
+          <a:graphicData uri="http://schemas.openxmlformats.org/drawingml/2006/table">
+            <a:tbl>
+              <a:tblPr firstRow="1" bandRow="1">
+                <a:tableStyleId>{5C22544A-7EE6-4342-B048-85BDC9FD1C3A}</a:tableStyleId>
+              </a:tblPr>
+              <a:tblGrid>
+                <a:gridCol w="1715801">
+                  <a:extLst>
+                    <a:ext uri="{9D8B030D-6E8A-4147-A177-3AD203B41FA5}">
+                      <a16:colId xmlns:a16="http://schemas.microsoft.com/office/drawing/2014/main" val="20000"/>
+                    </a:ext>
+                  </a:extLst>
+                </a:gridCol>
+                <a:gridCol w="2405136">
+                  <a:extLst>
+                    <a:ext uri="{9D8B030D-6E8A-4147-A177-3AD203B41FA5}">
+                      <a16:colId xmlns:a16="http://schemas.microsoft.com/office/drawing/2014/main" val="20001"/>
+                    </a:ext>
+                  </a:extLst>
+                </a:gridCol>
+                <a:gridCol w="2816811">
+                  <a:extLst>
+                    <a:ext uri="{9D8B030D-6E8A-4147-A177-3AD203B41FA5}">
+                      <a16:colId xmlns:a16="http://schemas.microsoft.com/office/drawing/2014/main" val="4235085973"/>
+                    </a:ext>
+                  </a:extLst>
+                </a:gridCol>
+              </a:tblGrid>
+              <a:tr h="549840">
+                <a:tc>
+                  <a:txBody>
+                    <a:bodyPr/>
+                    <a:lstStyle/>
+                    <a:p>
+                      <a:r>
+                        <a:rPr lang="it-IT" sz="1200" noProof="0" dirty="0"/>
+                        <a:t>Attributo</a:t>
+                      </a:r>
+                      <a:r>
+                        <a:rPr lang="en-US" sz="1200" dirty="0"/>
+                        <a:t> </a:t>
+                      </a:r>
+                    </a:p>
+                    <a:p>
+                      <a:r>
+                        <a:rPr lang="it-IT" sz="1200" noProof="0" dirty="0"/>
+                        <a:t>osservazione</a:t>
+                      </a:r>
+                    </a:p>
+                    <a:p>
+                      <a:r>
+                        <a:rPr lang="en-US" sz="1200" dirty="0"/>
+                        <a:t>ACOM</a:t>
+                      </a:r>
+                    </a:p>
+                  </a:txBody>
+                  <a:tcPr marL="55443" marR="55443" marT="27722" marB="27722" anchor="ctr"/>
+                </a:tc>
+                <a:tc>
+                  <a:txBody>
+                    <a:bodyPr/>
+                    <a:lstStyle/>
+                    <a:p>
+                      <a:r>
+                        <a:rPr lang="en-US" sz="1200" dirty="0"/>
+                        <a:t>Valore</a:t>
+                      </a:r>
+                    </a:p>
+                  </a:txBody>
+                  <a:tcPr marL="55443" marR="55443" marT="27722" marB="27722" anchor="ctr"/>
+                </a:tc>
+                <a:tc>
+                  <a:txBody>
+                    <a:bodyPr/>
+                    <a:lstStyle/>
+                    <a:p>
+                      <a:r>
+                        <a:rPr lang="en-US" sz="1200" dirty="0" err="1"/>
+                        <a:t>Attributi</a:t>
+                      </a:r>
+                      <a:r>
+                        <a:rPr lang="en-US" sz="1200" dirty="0"/>
+                        <a:t> e </a:t>
+                      </a:r>
+                      <a:r>
+                        <a:rPr lang="en-US" sz="1200" dirty="0" err="1"/>
+                        <a:t>valori</a:t>
+                      </a:r>
+                      <a:r>
+                        <a:rPr lang="en-US" sz="1200" dirty="0"/>
+                        <a:t> </a:t>
+                      </a:r>
+                      <a:r>
+                        <a:rPr lang="en-US" sz="1200" dirty="0" err="1"/>
+                        <a:t>osservazione</a:t>
+                      </a:r>
+                      <a:r>
+                        <a:rPr lang="en-US" sz="1200" dirty="0"/>
+                        <a:t> FHIR</a:t>
+                      </a:r>
+                    </a:p>
+                  </a:txBody>
+                  <a:tcPr marL="55443" marR="55443" marT="27722" marB="27722" anchor="ctr"/>
+                </a:tc>
+                <a:extLst>
+                  <a:ext uri="{0D108BD9-81ED-4DB2-BD59-A6C34878D82A}">
+                    <a16:rowId xmlns:a16="http://schemas.microsoft.com/office/drawing/2014/main" val="10000"/>
+                  </a:ext>
+                </a:extLst>
+              </a:tr>
+              <a:tr h="432267">
+                <a:tc>
+                  <a:txBody>
+                    <a:bodyPr/>
+                    <a:lstStyle/>
+                    <a:p>
+                      <a:r>
+                        <a:rPr lang="en-US" sz="1200"/>
+                        <a:t>Object</a:t>
+                      </a:r>
+                    </a:p>
+                  </a:txBody>
+                  <a:tcPr marL="55443" marR="55443" marT="27722" marB="27722" anchor="ctr"/>
+                </a:tc>
+                <a:tc>
+                  <a:txBody>
+                    <a:bodyPr/>
+                    <a:lstStyle/>
+                    <a:p>
+                      <a:r>
+                        <a:rPr lang="en-US" sz="1200" dirty="0"/>
+                        <a:t>Numeric Observation</a:t>
+                      </a:r>
+                    </a:p>
+                  </a:txBody>
+                  <a:tcPr marL="55443" marR="55443" marT="27722" marB="27722" anchor="ctr"/>
+                </a:tc>
+                <a:tc>
+                  <a:txBody>
+                    <a:bodyPr/>
+                    <a:lstStyle/>
+                    <a:p>
+                      <a:r>
+                        <a:rPr lang="en-US" sz="1200" dirty="0"/>
+                        <a:t>{</a:t>
+                      </a:r>
+                    </a:p>
+                    <a:p>
+                      <a:r>
+                        <a:rPr lang="en-US" sz="1200" dirty="0"/>
+                        <a:t>“</a:t>
+                      </a:r>
+                      <a:r>
+                        <a:rPr lang="en-US" sz="1200" dirty="0" err="1"/>
+                        <a:t>resourceType</a:t>
+                      </a:r>
+                      <a:r>
+                        <a:rPr lang="en-US" sz="1200" dirty="0"/>
+                        <a:t>”: “Observation”,</a:t>
+                      </a:r>
+                    </a:p>
+                  </a:txBody>
+                  <a:tcPr marL="55443" marR="55443" marT="27722" marB="27722" anchor="ctr"/>
+                </a:tc>
+                <a:extLst>
+                  <a:ext uri="{0D108BD9-81ED-4DB2-BD59-A6C34878D82A}">
+                    <a16:rowId xmlns:a16="http://schemas.microsoft.com/office/drawing/2014/main" val="3422855056"/>
+                  </a:ext>
+                </a:extLst>
+              </a:tr>
+              <a:tr h="1049214">
+                <a:tc>
+                  <a:txBody>
+                    <a:bodyPr/>
+                    <a:lstStyle/>
+                    <a:p>
+                      <a:r>
+                        <a:rPr lang="en-US" sz="1200" dirty="0"/>
+                        <a:t>Type</a:t>
+                      </a:r>
+                    </a:p>
+                  </a:txBody>
+                  <a:tcPr marL="55443" marR="55443" marT="27722" marB="27722" anchor="ctr"/>
+                </a:tc>
+                <a:tc>
+                  <a:txBody>
+                    <a:bodyPr/>
+                    <a:lstStyle/>
+                    <a:p>
+                      <a:pPr marL="0" algn="l" defTabSz="914400" rtl="0" eaLnBrk="1" latinLnBrk="0" hangingPunct="1"/>
+                      <a:r>
+                        <a:rPr lang="it-IT" sz="1200" kern="1200" dirty="0">
+                          <a:solidFill>
+                            <a:schemeClr val="dk1"/>
+                          </a:solidFill>
+                          <a:latin typeface="+mn-lt"/>
+                          <a:ea typeface="+mn-ea"/>
+                          <a:cs typeface="+mn-cs"/>
+                        </a:rPr>
+                        <a:t>MDC_TEMP_BODY</a:t>
+                      </a:r>
+                    </a:p>
+                  </a:txBody>
+                  <a:tcPr marL="55443" marR="55443" marT="27722" marB="27722" anchor="ctr"/>
+                </a:tc>
+                <a:tc>
+                  <a:txBody>
+                    <a:bodyPr/>
+                    <a:lstStyle/>
+                    <a:p>
+                      <a:pPr marL="0" algn="l" defTabSz="914400" rtl="0" eaLnBrk="1" latinLnBrk="0" hangingPunct="1"/>
+                      <a:r>
+                        <a:rPr lang="en-US" sz="1800" b="0" kern="1200" dirty="0">
+                          <a:solidFill>
+                            <a:schemeClr val="dk1"/>
+                          </a:solidFill>
+                          <a:effectLst/>
+                          <a:latin typeface="+mn-lt"/>
+                          <a:ea typeface="+mn-ea"/>
+                          <a:cs typeface="+mn-cs"/>
+                        </a:rPr>
+                        <a:t>"</a:t>
+                      </a:r>
+                      <a:r>
+                        <a:rPr lang="en-US" sz="1200" kern="1200" dirty="0">
+                          <a:solidFill>
+                            <a:schemeClr val="dk1"/>
+                          </a:solidFill>
+                          <a:latin typeface="+mn-lt"/>
+                          <a:ea typeface="+mn-ea"/>
+                          <a:cs typeface="+mn-cs"/>
+                        </a:rPr>
+                        <a:t>code": {"coding": [{</a:t>
+                      </a:r>
+                    </a:p>
+                    <a:p>
+                      <a:pPr marL="0" algn="l" defTabSz="914400" rtl="0" eaLnBrk="1" latinLnBrk="0" hangingPunct="1"/>
+                      <a:r>
+                        <a:rPr lang="en-US" sz="1200" kern="1200" dirty="0">
+                          <a:solidFill>
+                            <a:schemeClr val="dk1"/>
+                          </a:solidFill>
+                          <a:latin typeface="+mn-lt"/>
+                          <a:ea typeface="+mn-ea"/>
+                          <a:cs typeface="+mn-cs"/>
+                        </a:rPr>
+                        <a:t>            "system": "http://loinc.org",</a:t>
+                      </a:r>
+                    </a:p>
+                    <a:p>
+                      <a:pPr marL="0" algn="l" defTabSz="914400" rtl="0" eaLnBrk="1" latinLnBrk="0" hangingPunct="1"/>
+                      <a:r>
+                        <a:rPr lang="en-US" sz="1200" kern="1200" dirty="0">
+                          <a:solidFill>
+                            <a:schemeClr val="dk1"/>
+                          </a:solidFill>
+                          <a:latin typeface="+mn-lt"/>
+                          <a:ea typeface="+mn-ea"/>
+                          <a:cs typeface="+mn-cs"/>
+                        </a:rPr>
+                        <a:t>            "code": "8310-5",</a:t>
+                      </a:r>
+                    </a:p>
+                    <a:p>
+                      <a:pPr marL="0" algn="l" defTabSz="914400" rtl="0" eaLnBrk="1" latinLnBrk="0" hangingPunct="1"/>
+                      <a:r>
+                        <a:rPr lang="en-US" sz="1200" kern="1200" dirty="0">
+                          <a:solidFill>
+                            <a:schemeClr val="dk1"/>
+                          </a:solidFill>
+                          <a:latin typeface="+mn-lt"/>
+                          <a:ea typeface="+mn-ea"/>
+                          <a:cs typeface="+mn-cs"/>
+                        </a:rPr>
+                        <a:t>            "display": "Body temperature“}],</a:t>
+                      </a:r>
+                    </a:p>
+                    <a:p>
+                      <a:pPr marL="0" algn="l" defTabSz="914400" rtl="0" eaLnBrk="1" latinLnBrk="0" hangingPunct="1"/>
+                      <a:r>
+                        <a:rPr lang="en-US" sz="1200" kern="1200" dirty="0">
+                          <a:solidFill>
+                            <a:schemeClr val="dk1"/>
+                          </a:solidFill>
+                          <a:latin typeface="+mn-lt"/>
+                          <a:ea typeface="+mn-ea"/>
+                          <a:cs typeface="+mn-cs"/>
+                        </a:rPr>
+                        <a:t>            "text": "Body temperature"</a:t>
+                      </a:r>
+                    </a:p>
+                    <a:p>
+                      <a:pPr marL="0" algn="l" defTabSz="914400" rtl="0" eaLnBrk="1" latinLnBrk="0" hangingPunct="1"/>
+                      <a:r>
+                        <a:rPr lang="en-US" sz="1200" kern="1200" dirty="0">
+                          <a:solidFill>
+                            <a:schemeClr val="dk1"/>
+                          </a:solidFill>
+                          <a:latin typeface="+mn-lt"/>
+                          <a:ea typeface="+mn-ea"/>
+                          <a:cs typeface="+mn-cs"/>
+                        </a:rPr>
+                        <a:t>        },</a:t>
+                      </a:r>
+                    </a:p>
+                  </a:txBody>
+                  <a:tcPr marL="55443" marR="55443" marT="27722" marB="27722" anchor="ctr"/>
+                </a:tc>
+                <a:extLst>
+                  <a:ext uri="{0D108BD9-81ED-4DB2-BD59-A6C34878D82A}">
+                    <a16:rowId xmlns:a16="http://schemas.microsoft.com/office/drawing/2014/main" val="10001"/>
+                  </a:ext>
+                </a:extLst>
+              </a:tr>
+              <a:tr h="555304">
+                <a:tc>
+                  <a:txBody>
+                    <a:bodyPr/>
+                    <a:lstStyle/>
+                    <a:p>
+                      <a:pPr marL="0" algn="l" defTabSz="914400" rtl="0" eaLnBrk="1" latinLnBrk="0" hangingPunct="1"/>
+                      <a:r>
+                        <a:rPr lang="en-US" sz="1200" kern="1200" dirty="0"/>
+                        <a:t>Unit Code </a:t>
+                      </a:r>
+                      <a:endParaRPr lang="en-US" sz="1200" kern="1200" dirty="0">
+                        <a:solidFill>
+                          <a:schemeClr val="dk1"/>
+                        </a:solidFill>
+                        <a:latin typeface="+mn-lt"/>
+                        <a:ea typeface="+mn-ea"/>
+                        <a:cs typeface="+mn-cs"/>
+                      </a:endParaRPr>
+                    </a:p>
+                  </a:txBody>
+                  <a:tcPr marL="55443" marR="55443" marT="27722" marB="27722" anchor="ctr"/>
+                </a:tc>
+                <a:tc>
+                  <a:txBody>
+                    <a:bodyPr/>
+                    <a:lstStyle/>
+                    <a:p>
+                      <a:pPr marL="0" marR="0" lvl="0" indent="0" algn="l" defTabSz="914400" rtl="0" eaLnBrk="1" fontAlgn="auto" latinLnBrk="0" hangingPunct="1">
+                        <a:lnSpc>
+                          <a:spcPct val="100000"/>
+                        </a:lnSpc>
+                        <a:spcBef>
+                          <a:spcPts val="0"/>
+                        </a:spcBef>
+                        <a:spcAft>
+                          <a:spcPts val="0"/>
+                        </a:spcAft>
+                        <a:buClrTx/>
+                        <a:buSzTx/>
+                        <a:buFontTx/>
+                        <a:buNone/>
+                        <a:tabLst/>
+                        <a:defRPr/>
+                      </a:pPr>
+                      <a:r>
+                        <a:rPr lang="it-IT" sz="1200" kern="1200" dirty="0">
+                          <a:solidFill>
+                            <a:schemeClr val="dk1"/>
+                          </a:solidFill>
+                          <a:latin typeface="+mn-lt"/>
+                          <a:ea typeface="+mn-ea"/>
+                          <a:cs typeface="+mn-cs"/>
+                        </a:rPr>
+                        <a:t>MDC_DIM_DEGC</a:t>
+                      </a:r>
+                    </a:p>
+                    <a:p>
+                      <a:endParaRPr lang="it-IT" sz="1200" kern="1200" dirty="0">
+                        <a:solidFill>
+                          <a:schemeClr val="dk1"/>
+                        </a:solidFill>
+                        <a:latin typeface="+mn-lt"/>
+                        <a:ea typeface="+mn-ea"/>
+                        <a:cs typeface="+mn-cs"/>
+                      </a:endParaRPr>
+                    </a:p>
+                  </a:txBody>
+                  <a:tcPr marL="55443" marR="55443" marT="27722" marB="27722" anchor="ctr"/>
+                </a:tc>
+                <a:tc rowSpan="2">
+                  <a:txBody>
+                    <a:bodyPr/>
+                    <a:lstStyle/>
+                    <a:p>
+                      <a:r>
+                        <a:rPr lang="it-IT" sz="1800" b="0" kern="1200" dirty="0">
+                          <a:solidFill>
+                            <a:schemeClr val="dk1"/>
+                          </a:solidFill>
+                          <a:effectLst/>
+                          <a:latin typeface="+mn-lt"/>
+                          <a:ea typeface="+mn-ea"/>
+                          <a:cs typeface="+mn-cs"/>
+                        </a:rPr>
+                        <a:t> </a:t>
+                      </a:r>
+                      <a:r>
+                        <a:rPr lang="it-IT" sz="1200" kern="1200" dirty="0">
+                          <a:solidFill>
+                            <a:schemeClr val="dk1"/>
+                          </a:solidFill>
+                          <a:latin typeface="+mn-lt"/>
+                          <a:ea typeface="+mn-ea"/>
+                          <a:cs typeface="+mn-cs"/>
+                        </a:rPr>
+                        <a:t>"</a:t>
+                      </a:r>
+                      <a:r>
+                        <a:rPr lang="it-IT" sz="1200" kern="1200" dirty="0" err="1">
+                          <a:solidFill>
+                            <a:schemeClr val="dk1"/>
+                          </a:solidFill>
+                          <a:latin typeface="+mn-lt"/>
+                          <a:ea typeface="+mn-ea"/>
+                          <a:cs typeface="+mn-cs"/>
+                        </a:rPr>
+                        <a:t>valueQuantity</a:t>
+                      </a:r>
+                      <a:r>
+                        <a:rPr lang="it-IT" sz="1200" kern="1200" dirty="0">
+                          <a:solidFill>
+                            <a:schemeClr val="dk1"/>
+                          </a:solidFill>
+                          <a:latin typeface="+mn-lt"/>
+                          <a:ea typeface="+mn-ea"/>
+                          <a:cs typeface="+mn-cs"/>
+                        </a:rPr>
+                        <a:t>": {</a:t>
+                      </a:r>
+                    </a:p>
+                    <a:p>
+                      <a:r>
+                        <a:rPr lang="it-IT" sz="1200" kern="1200" dirty="0">
+                          <a:solidFill>
+                            <a:schemeClr val="dk1"/>
+                          </a:solidFill>
+                          <a:latin typeface="+mn-lt"/>
+                          <a:ea typeface="+mn-ea"/>
+                          <a:cs typeface="+mn-cs"/>
+                        </a:rPr>
+                        <a:t>            "</a:t>
+                      </a:r>
+                      <a:r>
+                        <a:rPr lang="it-IT" sz="1200" kern="1200" dirty="0" err="1">
+                          <a:solidFill>
+                            <a:schemeClr val="dk1"/>
+                          </a:solidFill>
+                          <a:latin typeface="+mn-lt"/>
+                          <a:ea typeface="+mn-ea"/>
+                          <a:cs typeface="+mn-cs"/>
+                        </a:rPr>
+                        <a:t>value</a:t>
+                      </a:r>
+                      <a:r>
+                        <a:rPr lang="it-IT" sz="1200" kern="1200" dirty="0">
+                          <a:solidFill>
+                            <a:schemeClr val="dk1"/>
+                          </a:solidFill>
+                          <a:latin typeface="+mn-lt"/>
+                          <a:ea typeface="+mn-ea"/>
+                          <a:cs typeface="+mn-cs"/>
+                        </a:rPr>
+                        <a:t>": 36.5,</a:t>
+                      </a:r>
+                    </a:p>
+                    <a:p>
+                      <a:r>
+                        <a:rPr lang="it-IT" sz="1200" kern="1200" dirty="0">
+                          <a:solidFill>
+                            <a:schemeClr val="dk1"/>
+                          </a:solidFill>
+                          <a:latin typeface="+mn-lt"/>
+                          <a:ea typeface="+mn-ea"/>
+                          <a:cs typeface="+mn-cs"/>
+                        </a:rPr>
+                        <a:t>            "</a:t>
+                      </a:r>
+                      <a:r>
+                        <a:rPr lang="it-IT" sz="1200" kern="1200" dirty="0" err="1">
+                          <a:solidFill>
+                            <a:schemeClr val="dk1"/>
+                          </a:solidFill>
+                          <a:latin typeface="+mn-lt"/>
+                          <a:ea typeface="+mn-ea"/>
+                          <a:cs typeface="+mn-cs"/>
+                        </a:rPr>
+                        <a:t>unit</a:t>
+                      </a:r>
+                      <a:r>
+                        <a:rPr lang="it-IT" sz="1200" kern="1200" dirty="0">
+                          <a:solidFill>
+                            <a:schemeClr val="dk1"/>
+                          </a:solidFill>
+                          <a:latin typeface="+mn-lt"/>
+                          <a:ea typeface="+mn-ea"/>
+                          <a:cs typeface="+mn-cs"/>
+                        </a:rPr>
+                        <a:t>": "C",</a:t>
+                      </a:r>
+                    </a:p>
+                    <a:p>
+                      <a:r>
+                        <a:rPr lang="it-IT" sz="1200" kern="1200" dirty="0">
+                          <a:solidFill>
+                            <a:schemeClr val="dk1"/>
+                          </a:solidFill>
+                          <a:latin typeface="+mn-lt"/>
+                          <a:ea typeface="+mn-ea"/>
+                          <a:cs typeface="+mn-cs"/>
+                        </a:rPr>
+                        <a:t>            "system": "http://unitsofmeasure.org",</a:t>
+                      </a:r>
+                    </a:p>
+                    <a:p>
+                      <a:r>
+                        <a:rPr lang="it-IT" sz="1200" kern="1200" dirty="0">
+                          <a:solidFill>
+                            <a:schemeClr val="dk1"/>
+                          </a:solidFill>
+                          <a:latin typeface="+mn-lt"/>
+                          <a:ea typeface="+mn-ea"/>
+                          <a:cs typeface="+mn-cs"/>
+                        </a:rPr>
+                        <a:t>            "code": "Cel"</a:t>
+                      </a:r>
+                    </a:p>
+                    <a:p>
+                      <a:r>
+                        <a:rPr lang="it-IT" sz="1200" kern="1200" dirty="0">
+                          <a:solidFill>
+                            <a:schemeClr val="dk1"/>
+                          </a:solidFill>
+                          <a:latin typeface="+mn-lt"/>
+                          <a:ea typeface="+mn-ea"/>
+                          <a:cs typeface="+mn-cs"/>
+                        </a:rPr>
+                        <a:t>        }</a:t>
+                      </a:r>
+                      <a:r>
+                        <a:rPr lang="en-US" sz="1200" kern="1200" dirty="0">
+                          <a:solidFill>
+                            <a:schemeClr val="dk1"/>
+                          </a:solidFill>
+                          <a:latin typeface="+mn-lt"/>
+                          <a:ea typeface="+mn-ea"/>
+                          <a:cs typeface="+mn-cs"/>
+                        </a:rPr>
+                        <a:t>,</a:t>
+                      </a:r>
+                    </a:p>
+                  </a:txBody>
+                  <a:tcPr marL="55443" marR="55443" marT="27722" marB="27722" anchor="ctr"/>
+                </a:tc>
+                <a:extLst>
+                  <a:ext uri="{0D108BD9-81ED-4DB2-BD59-A6C34878D82A}">
+                    <a16:rowId xmlns:a16="http://schemas.microsoft.com/office/drawing/2014/main" val="10003"/>
+                  </a:ext>
+                </a:extLst>
+              </a:tr>
+              <a:tr h="910056">
+                <a:tc>
+                  <a:txBody>
+                    <a:bodyPr/>
+                    <a:lstStyle/>
+                    <a:p>
+                      <a:pPr marL="0" algn="l" defTabSz="914400" rtl="0" eaLnBrk="1" latinLnBrk="0" hangingPunct="1"/>
+                      <a:r>
+                        <a:rPr lang="en-US" sz="1200" kern="1200"/>
+                        <a:t>Observed Value </a:t>
+                      </a:r>
+                      <a:endParaRPr lang="en-US" sz="1200" kern="1200">
+                        <a:solidFill>
+                          <a:schemeClr val="dk1"/>
+                        </a:solidFill>
+                        <a:latin typeface="+mn-lt"/>
+                        <a:ea typeface="+mn-ea"/>
+                        <a:cs typeface="+mn-cs"/>
+                      </a:endParaRPr>
+                    </a:p>
+                  </a:txBody>
+                  <a:tcPr marL="55443" marR="55443" marT="27722" marB="27722" anchor="ctr"/>
+                </a:tc>
+                <a:tc>
+                  <a:txBody>
+                    <a:bodyPr/>
+                    <a:lstStyle/>
+                    <a:p>
+                      <a:pPr marL="0" marR="0" lvl="0" indent="0" algn="l" defTabSz="914400" rtl="0" eaLnBrk="1" fontAlgn="auto" latinLnBrk="0" hangingPunct="1">
+                        <a:lnSpc>
+                          <a:spcPct val="100000"/>
+                        </a:lnSpc>
+                        <a:spcBef>
+                          <a:spcPts val="0"/>
+                        </a:spcBef>
+                        <a:spcAft>
+                          <a:spcPts val="0"/>
+                        </a:spcAft>
+                        <a:buClrTx/>
+                        <a:buSzTx/>
+                        <a:buFontTx/>
+                        <a:buNone/>
+                        <a:tabLst/>
+                        <a:defRPr/>
+                      </a:pPr>
+                      <a:r>
+                        <a:rPr lang="it-IT" sz="1200" kern="1200" dirty="0">
+                          <a:solidFill>
+                            <a:schemeClr val="dk1"/>
+                          </a:solidFill>
+                          <a:latin typeface="+mn-lt"/>
+                          <a:ea typeface="+mn-ea"/>
+                          <a:cs typeface="+mn-cs"/>
+                        </a:rPr>
+                        <a:t>36.5</a:t>
+                      </a:r>
+                    </a:p>
+                  </a:txBody>
+                  <a:tcPr marL="55443" marR="55443" marT="27722" marB="27722" anchor="ctr"/>
+                </a:tc>
+                <a:tc vMerge="1">
+                  <a:txBody>
+                    <a:bodyPr/>
+                    <a:lstStyle/>
+                    <a:p>
+                      <a:endParaRPr lang="en-US" sz="1400" dirty="0"/>
+                    </a:p>
+                  </a:txBody>
+                  <a:tcPr marL="68580" marR="68580" marT="34290" marB="34290">
+                    <a:lnT w="12700" cap="flat" cmpd="sng" algn="ctr">
+                      <a:solidFill>
+                        <a:schemeClr val="tx1"/>
+                      </a:solidFill>
+                      <a:prstDash val="solid"/>
+                      <a:round/>
+                      <a:headEnd type="none" w="med" len="med"/>
+                      <a:tailEnd type="none" w="med" len="med"/>
+                    </a:lnT>
+                  </a:tcPr>
+                </a:tc>
+                <a:extLst>
+                  <a:ext uri="{0D108BD9-81ED-4DB2-BD59-A6C34878D82A}">
+                    <a16:rowId xmlns:a16="http://schemas.microsoft.com/office/drawing/2014/main" val="10004"/>
+                  </a:ext>
+                </a:extLst>
+              </a:tr>
+              <a:tr h="616486">
+                <a:tc>
+                  <a:txBody>
+                    <a:bodyPr/>
+                    <a:lstStyle/>
+                    <a:p>
+                      <a:r>
+                        <a:rPr lang="en-US" sz="1200" dirty="0"/>
+                        <a:t>Time stamp</a:t>
+                      </a:r>
+                    </a:p>
+                  </a:txBody>
+                  <a:tcPr marL="55443" marR="55443" marT="27722" marB="27722" anchor="ctr"/>
+                </a:tc>
+                <a:tc>
+                  <a:txBody>
+                    <a:bodyPr/>
+                    <a:lstStyle/>
+                    <a:p>
+                      <a:pPr marL="0" marR="0" lvl="0" indent="0" algn="l" defTabSz="914400" rtl="0" eaLnBrk="1" fontAlgn="auto" latinLnBrk="0" hangingPunct="1">
+                        <a:lnSpc>
+                          <a:spcPct val="100000"/>
+                        </a:lnSpc>
+                        <a:spcBef>
+                          <a:spcPts val="0"/>
+                        </a:spcBef>
+                        <a:spcAft>
+                          <a:spcPts val="0"/>
+                        </a:spcAft>
+                        <a:buClrTx/>
+                        <a:buSzTx/>
+                        <a:buFontTx/>
+                        <a:buNone/>
+                        <a:tabLst/>
+                        <a:defRPr/>
+                      </a:pPr>
+                      <a:r>
+                        <a:rPr lang="it-IT" sz="1200" kern="1200" dirty="0">
+                          <a:solidFill>
+                            <a:schemeClr val="dk1"/>
+                          </a:solidFill>
+                          <a:latin typeface="+mn-lt"/>
+                          <a:ea typeface="+mn-ea"/>
+                          <a:cs typeface="+mn-cs"/>
+                        </a:rPr>
+                        <a:t>2024-05-24T10:27:02Z</a:t>
+                      </a:r>
+                    </a:p>
+                  </a:txBody>
+                  <a:tcPr marL="55443" marR="55443" marT="27722" marB="27722" anchor="ctr"/>
+                </a:tc>
+                <a:tc>
+                  <a:txBody>
+                    <a:bodyPr/>
+                    <a:lstStyle/>
+                    <a:p>
+                      <a:pPr marL="0" algn="l" defTabSz="914400" rtl="0" eaLnBrk="1" latinLnBrk="0" hangingPunct="1"/>
+                      <a:r>
+                        <a:rPr lang="it-IT" sz="1200" kern="1200" dirty="0">
+                          <a:solidFill>
+                            <a:schemeClr val="dk1"/>
+                          </a:solidFill>
+                          <a:latin typeface="+mn-lt"/>
+                          <a:ea typeface="+mn-ea"/>
+                          <a:cs typeface="+mn-cs"/>
+                        </a:rPr>
+                        <a:t>"</a:t>
+                      </a:r>
+                      <a:r>
+                        <a:rPr lang="it-IT" sz="1200" kern="1200" dirty="0" err="1">
+                          <a:solidFill>
+                            <a:schemeClr val="dk1"/>
+                          </a:solidFill>
+                          <a:latin typeface="+mn-lt"/>
+                          <a:ea typeface="+mn-ea"/>
+                          <a:cs typeface="+mn-cs"/>
+                        </a:rPr>
+                        <a:t>effectiveDateTime</a:t>
+                      </a:r>
+                      <a:r>
+                        <a:rPr lang="it-IT" sz="1200" kern="1200" dirty="0">
+                          <a:solidFill>
+                            <a:schemeClr val="dk1"/>
+                          </a:solidFill>
+                          <a:latin typeface="+mn-lt"/>
+                          <a:ea typeface="+mn-ea"/>
+                          <a:cs typeface="+mn-cs"/>
+                        </a:rPr>
+                        <a:t>": "2024-05-24T10:27:02Z"</a:t>
+                      </a:r>
+                    </a:p>
+                  </a:txBody>
+                  <a:tcPr marL="55443" marR="55443" marT="27722" marB="27722" anchor="ctr"/>
+                </a:tc>
+                <a:extLst>
+                  <a:ext uri="{0D108BD9-81ED-4DB2-BD59-A6C34878D82A}">
+                    <a16:rowId xmlns:a16="http://schemas.microsoft.com/office/drawing/2014/main" val="10005"/>
+                  </a:ext>
+                </a:extLst>
+              </a:tr>
+            </a:tbl>
+          </a:graphicData>
+        </a:graphic>
+      </p:graphicFrame>
+      <p:sp>
+        <p:nvSpPr>
+          <p:cNvPr id="4" name="Segnaposto numero diapositiva 3">
+            <a:extLst>
+              <a:ext uri="{FF2B5EF4-FFF2-40B4-BE49-F238E27FC236}">
+                <a16:creationId xmlns:a16="http://schemas.microsoft.com/office/drawing/2014/main" id="{24FA05D7-6198-9DD7-9CBB-A68CE906CB8C}"/>
+              </a:ext>
+            </a:extLst>
+          </p:cNvPr>
+          <p:cNvSpPr>
+            <a:spLocks noGrp="1"/>
+          </p:cNvSpPr>
+          <p:nvPr>
+            <p:ph type="sldNum" sz="quarter" idx="12"/>
+          </p:nvPr>
+        </p:nvSpPr>
+        <p:spPr/>
+        <p:txBody>
+          <a:bodyPr/>
+          <a:lstStyle/>
           <a:p>
             <a:pPr rtl="0"/>
-            <a:r>
-              <a:rPr lang="it-IT"/>
-              <a:t>brita@firstupconsultants.com</a:t>
-            </a:r>
-          </a:p>
-          <a:p>
-            <a:pPr rtl="0"/>
-            <a:r>
-              <a:rPr lang="it-IT"/>
-              <a:t>www.firstupconsultants.com</a:t>
-            </a:r>
+            <a:fld id="{294A09A9-5501-47C1-A89A-A340965A2BE2}" type="slidenum">
+              <a:rPr lang="it-IT" smtClean="0"/>
+              <a:pPr rtl="0"/>
+              <a:t>7</a:t>
+            </a:fld>
+            <a:endParaRPr lang="it-IT" dirty="0">
+              <a:latin typeface="+mn-lt"/>
+            </a:endParaRPr>
           </a:p>
         </p:txBody>
       </p:sp>
     </p:spTree>
     <p:extLst>
       <p:ext uri="{BB962C8B-B14F-4D97-AF65-F5344CB8AC3E}">
-        <p14:creationId xmlns:p14="http://schemas.microsoft.com/office/powerpoint/2010/main" val="4261132419"/>
+        <p14:creationId xmlns:p14="http://schemas.microsoft.com/office/powerpoint/2010/main" val="1031111158"/>
       </p:ext>
     </p:extLst>
   </p:cSld>
@@ -11010,6 +15184,35 @@
 </file>
 
 <file path=customXml/item1.xml><?xml version="1.0" encoding="utf-8"?>
+<?mso-contentType ?>
+<FormTemplates xmlns="http://schemas.microsoft.com/sharepoint/v3/contenttype/forms">
+  <Display>DocumentLibraryForm</Display>
+  <Edit>DocumentLibraryForm</Edit>
+  <New>DocumentLibraryForm</New>
+</FormTemplates>
+</file>
+
+<file path=customXml/item2.xml><?xml version="1.0" encoding="utf-8"?>
+<p:properties xmlns:p="http://schemas.microsoft.com/office/2006/metadata/properties" xmlns:xsi="http://www.w3.org/2001/XMLSchema-instance" xmlns:pc="http://schemas.microsoft.com/office/infopath/2007/PartnerControls">
+  <documentManagement>
+    <Background xmlns="71af3243-3dd4-4a8d-8c0d-dd76da1f02a5">false</Background>
+    <Status xmlns="71af3243-3dd4-4a8d-8c0d-dd76da1f02a5">Not started</Status>
+    <_ip_UnifiedCompliancePolicyUIAction xmlns="http://schemas.microsoft.com/sharepoint/v3" xsi:nil="true"/>
+    <Image xmlns="71af3243-3dd4-4a8d-8c0d-dd76da1f02a5">
+      <Url xsi:nil="true"/>
+      <Description xsi:nil="true"/>
+    </Image>
+    <_ip_UnifiedCompliancePolicyProperties xmlns="http://schemas.microsoft.com/sharepoint/v3" xsi:nil="true"/>
+    <ImageTagsTaxHTField xmlns="71af3243-3dd4-4a8d-8c0d-dd76da1f02a5">
+      <Terms xmlns="http://schemas.microsoft.com/office/infopath/2007/PartnerControls"/>
+    </ImageTagsTaxHTField>
+    <TaxCatchAll xmlns="230e9df3-be65-4c73-a93b-d1236ebd677e" xsi:nil="true"/>
+    <MediaServiceKeyPoints xmlns="71af3243-3dd4-4a8d-8c0d-dd76da1f02a5" xsi:nil="true"/>
+  </documentManagement>
+</p:properties>
+</file>
+
+<file path=customXml/item3.xml><?xml version="1.0" encoding="utf-8"?>
 <ct:contentTypeSchema xmlns:ct="http://schemas.microsoft.com/office/2006/metadata/contentType" xmlns:ma="http://schemas.microsoft.com/office/2006/metadata/properties/metaAttributes" ct:_="" ma:_="" ma:contentTypeName="Document" ma:contentTypeID="0x01010079F111ED35F8CC479449609E8A0923A6" ma:contentTypeVersion="28" ma:contentTypeDescription="Create a new document." ma:contentTypeScope="" ma:versionID="60f5a4f2d2b0abadcf532d48ebf9cb71">
   <xsd:schema xmlns:xsd="http://www.w3.org/2001/XMLSchema" xmlns:xs="http://www.w3.org/2001/XMLSchema" xmlns:p="http://schemas.microsoft.com/office/2006/metadata/properties" xmlns:ns1="http://schemas.microsoft.com/sharepoint/v3" xmlns:ns2="71af3243-3dd4-4a8d-8c0d-dd76da1f02a5" xmlns:ns3="16c05727-aa75-4e4a-9b5f-8a80a1165891" xmlns:ns4="230e9df3-be65-4c73-a93b-d1236ebd677e" targetNamespace="http://schemas.microsoft.com/office/2006/metadata/properties" ma:root="true" ma:fieldsID="7dd78129e6a1811f84807ad11c651531" ns1:_="" ns2:_="" ns3:_="" ns4:_="">
     <xsd:import namespace="http://schemas.microsoft.com/sharepoint/v3"/>
@@ -11321,36 +15524,27 @@
 </ct:contentTypeSchema>
 </file>
 
-<file path=customXml/item2.xml><?xml version="1.0" encoding="utf-8"?>
-<p:properties xmlns:p="http://schemas.microsoft.com/office/2006/metadata/properties" xmlns:xsi="http://www.w3.org/2001/XMLSchema-instance" xmlns:pc="http://schemas.microsoft.com/office/infopath/2007/PartnerControls">
-  <documentManagement>
-    <Background xmlns="71af3243-3dd4-4a8d-8c0d-dd76da1f02a5">false</Background>
-    <Status xmlns="71af3243-3dd4-4a8d-8c0d-dd76da1f02a5">Not started</Status>
-    <_ip_UnifiedCompliancePolicyUIAction xmlns="http://schemas.microsoft.com/sharepoint/v3" xsi:nil="true"/>
-    <Image xmlns="71af3243-3dd4-4a8d-8c0d-dd76da1f02a5">
-      <Url xsi:nil="true"/>
-      <Description xsi:nil="true"/>
-    </Image>
-    <_ip_UnifiedCompliancePolicyProperties xmlns="http://schemas.microsoft.com/sharepoint/v3" xsi:nil="true"/>
-    <ImageTagsTaxHTField xmlns="71af3243-3dd4-4a8d-8c0d-dd76da1f02a5">
-      <Terms xmlns="http://schemas.microsoft.com/office/infopath/2007/PartnerControls"/>
-    </ImageTagsTaxHTField>
-    <TaxCatchAll xmlns="230e9df3-be65-4c73-a93b-d1236ebd677e" xsi:nil="true"/>
-    <MediaServiceKeyPoints xmlns="71af3243-3dd4-4a8d-8c0d-dd76da1f02a5" xsi:nil="true"/>
-  </documentManagement>
-</p:properties>
+<file path=customXml/itemProps1.xml><?xml version="1.0" encoding="utf-8"?>
+<ds:datastoreItem xmlns:ds="http://schemas.openxmlformats.org/officeDocument/2006/customXml" ds:itemID="{C21FFAC0-05A2-416A-B06C-C248395482CF}">
+  <ds:schemaRefs>
+    <ds:schemaRef ds:uri="http://schemas.microsoft.com/sharepoint/v3/contenttype/forms"/>
+  </ds:schemaRefs>
+</ds:datastoreItem>
 </file>
 
-<file path=customXml/item3.xml><?xml version="1.0" encoding="utf-8"?>
-<?mso-contentType ?>
-<FormTemplates xmlns="http://schemas.microsoft.com/sharepoint/v3/contenttype/forms">
-  <Display>DocumentLibraryForm</Display>
-  <Edit>DocumentLibraryForm</Edit>
-  <New>DocumentLibraryForm</New>
-</FormTemplates>
+<file path=customXml/itemProps2.xml><?xml version="1.0" encoding="utf-8"?>
+<ds:datastoreItem xmlns:ds="http://schemas.openxmlformats.org/officeDocument/2006/customXml" ds:itemID="{4F4B194E-8B30-4377-8C59-ECFB902D2A26}">
+  <ds:schemaRefs>
+    <ds:schemaRef ds:uri="http://schemas.microsoft.com/office/2006/metadata/properties"/>
+    <ds:schemaRef ds:uri="http://schemas.microsoft.com/office/infopath/2007/PartnerControls"/>
+    <ds:schemaRef ds:uri="71af3243-3dd4-4a8d-8c0d-dd76da1f02a5"/>
+    <ds:schemaRef ds:uri="http://schemas.microsoft.com/sharepoint/v3"/>
+    <ds:schemaRef ds:uri="230e9df3-be65-4c73-a93b-d1236ebd677e"/>
+  </ds:schemaRefs>
+</ds:datastoreItem>
 </file>
 
-<file path=customXml/itemProps1.xml><?xml version="1.0" encoding="utf-8"?>
+<file path=customXml/itemProps3.xml><?xml version="1.0" encoding="utf-8"?>
 <ds:datastoreItem xmlns:ds="http://schemas.openxmlformats.org/officeDocument/2006/customXml" ds:itemID="{92DB9E12-8AC3-4138-BF4D-720A5525AB10}">
   <ds:schemaRefs>
     <ds:schemaRef ds:uri="http://schemas.microsoft.com/office/2006/metadata/contentType"/>
@@ -11371,26 +15565,6 @@
 </ds:datastoreItem>
 </file>
 
-<file path=customXml/itemProps2.xml><?xml version="1.0" encoding="utf-8"?>
-<ds:datastoreItem xmlns:ds="http://schemas.openxmlformats.org/officeDocument/2006/customXml" ds:itemID="{4F4B194E-8B30-4377-8C59-ECFB902D2A26}">
-  <ds:schemaRefs>
-    <ds:schemaRef ds:uri="http://schemas.microsoft.com/office/2006/metadata/properties"/>
-    <ds:schemaRef ds:uri="http://schemas.microsoft.com/office/infopath/2007/PartnerControls"/>
-    <ds:schemaRef ds:uri="71af3243-3dd4-4a8d-8c0d-dd76da1f02a5"/>
-    <ds:schemaRef ds:uri="http://schemas.microsoft.com/sharepoint/v3"/>
-    <ds:schemaRef ds:uri="230e9df3-be65-4c73-a93b-d1236ebd677e"/>
-  </ds:schemaRefs>
-</ds:datastoreItem>
-</file>
-
-<file path=customXml/itemProps3.xml><?xml version="1.0" encoding="utf-8"?>
-<ds:datastoreItem xmlns:ds="http://schemas.openxmlformats.org/officeDocument/2006/customXml" ds:itemID="{C21FFAC0-05A2-416A-B06C-C248395482CF}">
-  <ds:schemaRefs>
-    <ds:schemaRef ds:uri="http://schemas.microsoft.com/sharepoint/v3/contenttype/forms"/>
-  </ds:schemaRefs>
-</ds:datastoreItem>
-</file>
-
 <file path=docMetadata/LabelInfo.xml><?xml version="1.0" encoding="utf-8"?>
 <clbl:labelList xmlns:clbl="http://schemas.microsoft.com/office/2020/mipLabelMetadata"/>
 </file>
</xml_diff>